<commit_message>
adding some counts + finishing powerpoint
</commit_message>
<xml_diff>
--- a/spotify_analysis.pptx
+++ b/spotify_analysis.pptx
@@ -5277,6 +5277,3043 @@
 </cs:chartStyle>
 </file>
 
+<file path=ppt/diagrams/colors1.xml><?xml version="1.0" encoding="utf-8"?>
+<dgm:colorsDef xmlns:dgm="http://schemas.openxmlformats.org/drawingml/2006/diagram" xmlns:a="http://schemas.openxmlformats.org/drawingml/2006/main" uniqueId="urn:microsoft.com/office/officeart/2005/8/colors/colorful4">
+  <dgm:title val=""/>
+  <dgm:desc val=""/>
+  <dgm:catLst>
+    <dgm:cat type="colorful" pri="10400"/>
+  </dgm:catLst>
+  <dgm:styleLbl name="node0">
+    <dgm:fillClrLst meth="repeat">
+      <a:schemeClr val="accent3"/>
+    </dgm:fillClrLst>
+    <dgm:linClrLst meth="repeat">
+      <a:schemeClr val="lt1"/>
+    </dgm:linClrLst>
+    <dgm:effectClrLst/>
+    <dgm:txLinClrLst/>
+    <dgm:txFillClrLst/>
+    <dgm:txEffectClrLst/>
+  </dgm:styleLbl>
+  <dgm:styleLbl name="node1">
+    <dgm:fillClrLst>
+      <a:schemeClr val="accent4"/>
+      <a:schemeClr val="accent5"/>
+    </dgm:fillClrLst>
+    <dgm:linClrLst meth="repeat">
+      <a:schemeClr val="lt1"/>
+    </dgm:linClrLst>
+    <dgm:effectClrLst/>
+    <dgm:txLinClrLst/>
+    <dgm:txFillClrLst/>
+    <dgm:txEffectClrLst/>
+  </dgm:styleLbl>
+  <dgm:styleLbl name="alignNode1">
+    <dgm:fillClrLst>
+      <a:schemeClr val="accent4"/>
+      <a:schemeClr val="accent5"/>
+    </dgm:fillClrLst>
+    <dgm:linClrLst>
+      <a:schemeClr val="accent4"/>
+      <a:schemeClr val="accent5"/>
+    </dgm:linClrLst>
+    <dgm:effectClrLst/>
+    <dgm:txLinClrLst/>
+    <dgm:txFillClrLst/>
+    <dgm:txEffectClrLst/>
+  </dgm:styleLbl>
+  <dgm:styleLbl name="lnNode1">
+    <dgm:fillClrLst>
+      <a:schemeClr val="accent4"/>
+      <a:schemeClr val="accent5"/>
+    </dgm:fillClrLst>
+    <dgm:linClrLst meth="repeat">
+      <a:schemeClr val="lt1"/>
+    </dgm:linClrLst>
+    <dgm:effectClrLst/>
+    <dgm:txLinClrLst/>
+    <dgm:txFillClrLst/>
+    <dgm:txEffectClrLst/>
+  </dgm:styleLbl>
+  <dgm:styleLbl name="vennNode1">
+    <dgm:fillClrLst>
+      <a:schemeClr val="accent4">
+        <a:alpha val="50000"/>
+      </a:schemeClr>
+      <a:schemeClr val="accent5">
+        <a:alpha val="50000"/>
+      </a:schemeClr>
+    </dgm:fillClrLst>
+    <dgm:linClrLst meth="repeat">
+      <a:schemeClr val="lt1"/>
+    </dgm:linClrLst>
+    <dgm:effectClrLst/>
+    <dgm:txLinClrLst/>
+    <dgm:txFillClrLst/>
+    <dgm:txEffectClrLst/>
+  </dgm:styleLbl>
+  <dgm:styleLbl name="node2">
+    <dgm:fillClrLst>
+      <a:schemeClr val="accent5"/>
+    </dgm:fillClrLst>
+    <dgm:linClrLst meth="repeat">
+      <a:schemeClr val="lt1"/>
+    </dgm:linClrLst>
+    <dgm:effectClrLst/>
+    <dgm:txLinClrLst/>
+    <dgm:txFillClrLst/>
+    <dgm:txEffectClrLst/>
+  </dgm:styleLbl>
+  <dgm:styleLbl name="node3">
+    <dgm:fillClrLst>
+      <a:schemeClr val="accent6"/>
+    </dgm:fillClrLst>
+    <dgm:linClrLst meth="repeat">
+      <a:schemeClr val="lt1"/>
+    </dgm:linClrLst>
+    <dgm:effectClrLst/>
+    <dgm:txLinClrLst/>
+    <dgm:txFillClrLst/>
+    <dgm:txEffectClrLst/>
+  </dgm:styleLbl>
+  <dgm:styleLbl name="node4">
+    <dgm:fillClrLst>
+      <a:schemeClr val="accent1"/>
+    </dgm:fillClrLst>
+    <dgm:linClrLst meth="repeat">
+      <a:schemeClr val="lt1"/>
+    </dgm:linClrLst>
+    <dgm:effectClrLst/>
+    <dgm:txLinClrLst/>
+    <dgm:txFillClrLst/>
+    <dgm:txEffectClrLst/>
+  </dgm:styleLbl>
+  <dgm:styleLbl name="fgImgPlace1">
+    <dgm:fillClrLst>
+      <a:schemeClr val="accent4">
+        <a:tint val="50000"/>
+      </a:schemeClr>
+      <a:schemeClr val="accent5">
+        <a:tint val="50000"/>
+      </a:schemeClr>
+    </dgm:fillClrLst>
+    <dgm:linClrLst meth="repeat">
+      <a:schemeClr val="lt1"/>
+    </dgm:linClrLst>
+    <dgm:effectClrLst/>
+    <dgm:txLinClrLst/>
+    <dgm:txFillClrLst meth="repeat">
+      <a:schemeClr val="lt1"/>
+    </dgm:txFillClrLst>
+    <dgm:txEffectClrLst/>
+  </dgm:styleLbl>
+  <dgm:styleLbl name="alignImgPlace1">
+    <dgm:fillClrLst>
+      <a:schemeClr val="accent4">
+        <a:tint val="50000"/>
+      </a:schemeClr>
+      <a:schemeClr val="accent5">
+        <a:tint val="20000"/>
+      </a:schemeClr>
+    </dgm:fillClrLst>
+    <dgm:linClrLst meth="repeat">
+      <a:schemeClr val="lt1"/>
+    </dgm:linClrLst>
+    <dgm:effectClrLst/>
+    <dgm:txLinClrLst/>
+    <dgm:txFillClrLst meth="repeat">
+      <a:schemeClr val="lt1"/>
+    </dgm:txFillClrLst>
+    <dgm:txEffectClrLst/>
+  </dgm:styleLbl>
+  <dgm:styleLbl name="bgImgPlace1">
+    <dgm:fillClrLst>
+      <a:schemeClr val="accent4">
+        <a:tint val="50000"/>
+      </a:schemeClr>
+      <a:schemeClr val="accent5">
+        <a:tint val="20000"/>
+      </a:schemeClr>
+    </dgm:fillClrLst>
+    <dgm:linClrLst meth="repeat">
+      <a:schemeClr val="lt1"/>
+    </dgm:linClrLst>
+    <dgm:effectClrLst/>
+    <dgm:txLinClrLst/>
+    <dgm:txFillClrLst meth="repeat">
+      <a:schemeClr val="lt1"/>
+    </dgm:txFillClrLst>
+    <dgm:txEffectClrLst/>
+  </dgm:styleLbl>
+  <dgm:styleLbl name="sibTrans2D1">
+    <dgm:fillClrLst>
+      <a:schemeClr val="accent4"/>
+      <a:schemeClr val="accent5"/>
+    </dgm:fillClrLst>
+    <dgm:linClrLst meth="repeat">
+      <a:schemeClr val="lt1"/>
+    </dgm:linClrLst>
+    <dgm:effectClrLst/>
+    <dgm:txLinClrLst/>
+    <dgm:txFillClrLst/>
+    <dgm:txEffectClrLst/>
+  </dgm:styleLbl>
+  <dgm:styleLbl name="fgSibTrans2D1">
+    <dgm:fillClrLst>
+      <a:schemeClr val="accent4"/>
+      <a:schemeClr val="accent5"/>
+    </dgm:fillClrLst>
+    <dgm:linClrLst meth="repeat">
+      <a:schemeClr val="lt1"/>
+    </dgm:linClrLst>
+    <dgm:effectClrLst/>
+    <dgm:txLinClrLst/>
+    <dgm:txFillClrLst meth="repeat">
+      <a:schemeClr val="lt1"/>
+    </dgm:txFillClrLst>
+    <dgm:txEffectClrLst/>
+  </dgm:styleLbl>
+  <dgm:styleLbl name="bgSibTrans2D1">
+    <dgm:fillClrLst>
+      <a:schemeClr val="accent4"/>
+      <a:schemeClr val="accent5"/>
+    </dgm:fillClrLst>
+    <dgm:linClrLst meth="repeat">
+      <a:schemeClr val="lt1"/>
+    </dgm:linClrLst>
+    <dgm:effectClrLst/>
+    <dgm:txLinClrLst/>
+    <dgm:txFillClrLst meth="repeat">
+      <a:schemeClr val="lt1"/>
+    </dgm:txFillClrLst>
+    <dgm:txEffectClrLst/>
+  </dgm:styleLbl>
+  <dgm:styleLbl name="sibTrans1D1">
+    <dgm:fillClrLst/>
+    <dgm:linClrLst>
+      <a:schemeClr val="accent4"/>
+      <a:schemeClr val="accent5"/>
+    </dgm:linClrLst>
+    <dgm:effectClrLst/>
+    <dgm:txLinClrLst/>
+    <dgm:txFillClrLst meth="repeat">
+      <a:schemeClr val="tx1"/>
+    </dgm:txFillClrLst>
+    <dgm:txEffectClrLst/>
+  </dgm:styleLbl>
+  <dgm:styleLbl name="callout">
+    <dgm:fillClrLst meth="repeat">
+      <a:schemeClr val="accent4"/>
+    </dgm:fillClrLst>
+    <dgm:linClrLst meth="repeat">
+      <a:schemeClr val="accent4">
+        <a:tint val="50000"/>
+      </a:schemeClr>
+    </dgm:linClrLst>
+    <dgm:effectClrLst/>
+    <dgm:txLinClrLst/>
+    <dgm:txFillClrLst meth="repeat">
+      <a:schemeClr val="tx1"/>
+    </dgm:txFillClrLst>
+    <dgm:txEffectClrLst/>
+  </dgm:styleLbl>
+  <dgm:styleLbl name="asst0">
+    <dgm:fillClrLst meth="repeat">
+      <a:schemeClr val="accent4"/>
+    </dgm:fillClrLst>
+    <dgm:linClrLst meth="repeat">
+      <a:schemeClr val="lt1">
+        <a:shade val="80000"/>
+      </a:schemeClr>
+    </dgm:linClrLst>
+    <dgm:effectClrLst/>
+    <dgm:txLinClrLst/>
+    <dgm:txFillClrLst/>
+    <dgm:txEffectClrLst/>
+  </dgm:styleLbl>
+  <dgm:styleLbl name="asst1">
+    <dgm:fillClrLst meth="repeat">
+      <a:schemeClr val="accent5"/>
+    </dgm:fillClrLst>
+    <dgm:linClrLst meth="repeat">
+      <a:schemeClr val="lt1">
+        <a:shade val="80000"/>
+      </a:schemeClr>
+    </dgm:linClrLst>
+    <dgm:effectClrLst/>
+    <dgm:txLinClrLst/>
+    <dgm:txFillClrLst/>
+    <dgm:txEffectClrLst/>
+  </dgm:styleLbl>
+  <dgm:styleLbl name="asst2">
+    <dgm:fillClrLst>
+      <a:schemeClr val="accent6"/>
+    </dgm:fillClrLst>
+    <dgm:linClrLst meth="repeat">
+      <a:schemeClr val="lt1"/>
+    </dgm:linClrLst>
+    <dgm:effectClrLst/>
+    <dgm:txLinClrLst/>
+    <dgm:txFillClrLst/>
+    <dgm:txEffectClrLst/>
+  </dgm:styleLbl>
+  <dgm:styleLbl name="asst3">
+    <dgm:fillClrLst>
+      <a:schemeClr val="accent1"/>
+    </dgm:fillClrLst>
+    <dgm:linClrLst meth="repeat">
+      <a:schemeClr val="lt1"/>
+    </dgm:linClrLst>
+    <dgm:effectClrLst/>
+    <dgm:txLinClrLst/>
+    <dgm:txFillClrLst/>
+    <dgm:txEffectClrLst/>
+  </dgm:styleLbl>
+  <dgm:styleLbl name="asst4">
+    <dgm:fillClrLst>
+      <a:schemeClr val="accent2"/>
+    </dgm:fillClrLst>
+    <dgm:linClrLst meth="repeat">
+      <a:schemeClr val="lt1"/>
+    </dgm:linClrLst>
+    <dgm:effectClrLst/>
+    <dgm:txLinClrLst/>
+    <dgm:txFillClrLst/>
+    <dgm:txEffectClrLst/>
+  </dgm:styleLbl>
+  <dgm:styleLbl name="parChTrans2D1">
+    <dgm:fillClrLst meth="repeat">
+      <a:schemeClr val="accent4"/>
+    </dgm:fillClrLst>
+    <dgm:linClrLst meth="repeat">
+      <a:schemeClr val="lt1"/>
+    </dgm:linClrLst>
+    <dgm:effectClrLst/>
+    <dgm:txLinClrLst/>
+    <dgm:txFillClrLst meth="repeat">
+      <a:schemeClr val="lt1"/>
+    </dgm:txFillClrLst>
+    <dgm:txEffectClrLst/>
+  </dgm:styleLbl>
+  <dgm:styleLbl name="parChTrans2D2">
+    <dgm:fillClrLst meth="repeat">
+      <a:schemeClr val="accent5"/>
+    </dgm:fillClrLst>
+    <dgm:linClrLst meth="repeat">
+      <a:schemeClr val="lt1"/>
+    </dgm:linClrLst>
+    <dgm:effectClrLst/>
+    <dgm:txLinClrLst/>
+    <dgm:txFillClrLst/>
+    <dgm:txEffectClrLst/>
+  </dgm:styleLbl>
+  <dgm:styleLbl name="parChTrans2D3">
+    <dgm:fillClrLst meth="repeat">
+      <a:schemeClr val="accent5"/>
+    </dgm:fillClrLst>
+    <dgm:linClrLst meth="repeat">
+      <a:schemeClr val="lt1"/>
+    </dgm:linClrLst>
+    <dgm:effectClrLst/>
+    <dgm:txLinClrLst/>
+    <dgm:txFillClrLst/>
+    <dgm:txEffectClrLst/>
+  </dgm:styleLbl>
+  <dgm:styleLbl name="parChTrans2D4">
+    <dgm:fillClrLst meth="repeat">
+      <a:schemeClr val="accent6"/>
+    </dgm:fillClrLst>
+    <dgm:linClrLst meth="repeat">
+      <a:schemeClr val="lt1"/>
+    </dgm:linClrLst>
+    <dgm:effectClrLst/>
+    <dgm:txLinClrLst/>
+    <dgm:txFillClrLst meth="repeat">
+      <a:schemeClr val="lt1"/>
+    </dgm:txFillClrLst>
+    <dgm:txEffectClrLst/>
+  </dgm:styleLbl>
+  <dgm:styleLbl name="parChTrans1D1">
+    <dgm:fillClrLst meth="repeat">
+      <a:schemeClr val="accent4"/>
+    </dgm:fillClrLst>
+    <dgm:linClrLst meth="repeat">
+      <a:schemeClr val="accent4"/>
+    </dgm:linClrLst>
+    <dgm:effectClrLst/>
+    <dgm:txLinClrLst/>
+    <dgm:txFillClrLst meth="repeat">
+      <a:schemeClr val="tx1"/>
+    </dgm:txFillClrLst>
+    <dgm:txEffectClrLst/>
+  </dgm:styleLbl>
+  <dgm:styleLbl name="parChTrans1D2">
+    <dgm:fillClrLst meth="repeat">
+      <a:schemeClr val="accent4">
+        <a:tint val="90000"/>
+      </a:schemeClr>
+    </dgm:fillClrLst>
+    <dgm:linClrLst meth="repeat">
+      <a:schemeClr val="accent5"/>
+    </dgm:linClrLst>
+    <dgm:effectClrLst/>
+    <dgm:txLinClrLst/>
+    <dgm:txFillClrLst meth="repeat">
+      <a:schemeClr val="tx1"/>
+    </dgm:txFillClrLst>
+    <dgm:txEffectClrLst/>
+  </dgm:styleLbl>
+  <dgm:styleLbl name="parChTrans1D3">
+    <dgm:fillClrLst meth="repeat">
+      <a:schemeClr val="accent4">
+        <a:tint val="70000"/>
+      </a:schemeClr>
+    </dgm:fillClrLst>
+    <dgm:linClrLst meth="repeat">
+      <a:schemeClr val="accent6"/>
+    </dgm:linClrLst>
+    <dgm:effectClrLst/>
+    <dgm:txLinClrLst/>
+    <dgm:txFillClrLst meth="repeat">
+      <a:schemeClr val="tx1"/>
+    </dgm:txFillClrLst>
+    <dgm:txEffectClrLst/>
+  </dgm:styleLbl>
+  <dgm:styleLbl name="parChTrans1D4">
+    <dgm:fillClrLst meth="repeat">
+      <a:schemeClr val="accent4">
+        <a:tint val="50000"/>
+      </a:schemeClr>
+    </dgm:fillClrLst>
+    <dgm:linClrLst meth="repeat">
+      <a:schemeClr val="accent1"/>
+    </dgm:linClrLst>
+    <dgm:effectClrLst/>
+    <dgm:txLinClrLst/>
+    <dgm:txFillClrLst meth="repeat">
+      <a:schemeClr val="tx1"/>
+    </dgm:txFillClrLst>
+    <dgm:txEffectClrLst/>
+  </dgm:styleLbl>
+  <dgm:styleLbl name="fgAcc1">
+    <dgm:fillClrLst meth="repeat">
+      <a:schemeClr val="lt1">
+        <a:alpha val="90000"/>
+      </a:schemeClr>
+    </dgm:fillClrLst>
+    <dgm:linClrLst>
+      <a:schemeClr val="accent4"/>
+      <a:schemeClr val="accent5"/>
+    </dgm:linClrLst>
+    <dgm:effectClrLst/>
+    <dgm:txLinClrLst/>
+    <dgm:txFillClrLst meth="repeat">
+      <a:schemeClr val="dk1"/>
+    </dgm:txFillClrLst>
+    <dgm:txEffectClrLst/>
+  </dgm:styleLbl>
+  <dgm:styleLbl name="conFgAcc1">
+    <dgm:fillClrLst meth="repeat">
+      <a:schemeClr val="lt1">
+        <a:alpha val="90000"/>
+      </a:schemeClr>
+    </dgm:fillClrLst>
+    <dgm:linClrLst>
+      <a:schemeClr val="accent4"/>
+      <a:schemeClr val="accent5"/>
+    </dgm:linClrLst>
+    <dgm:effectClrLst/>
+    <dgm:txLinClrLst/>
+    <dgm:txFillClrLst meth="repeat">
+      <a:schemeClr val="dk1"/>
+    </dgm:txFillClrLst>
+    <dgm:txEffectClrLst/>
+  </dgm:styleLbl>
+  <dgm:styleLbl name="alignAcc1">
+    <dgm:fillClrLst meth="repeat">
+      <a:schemeClr val="lt1">
+        <a:alpha val="90000"/>
+      </a:schemeClr>
+    </dgm:fillClrLst>
+    <dgm:linClrLst>
+      <a:schemeClr val="accent4"/>
+      <a:schemeClr val="accent5"/>
+    </dgm:linClrLst>
+    <dgm:effectClrLst/>
+    <dgm:txLinClrLst/>
+    <dgm:txFillClrLst meth="repeat">
+      <a:schemeClr val="dk1"/>
+    </dgm:txFillClrLst>
+    <dgm:txEffectClrLst/>
+  </dgm:styleLbl>
+  <dgm:styleLbl name="trAlignAcc1">
+    <dgm:fillClrLst meth="repeat">
+      <a:schemeClr val="lt1">
+        <a:alpha val="40000"/>
+      </a:schemeClr>
+    </dgm:fillClrLst>
+    <dgm:linClrLst meth="repeat">
+      <a:schemeClr val="accent4"/>
+    </dgm:linClrLst>
+    <dgm:effectClrLst/>
+    <dgm:txLinClrLst/>
+    <dgm:txFillClrLst meth="repeat">
+      <a:schemeClr val="dk1"/>
+    </dgm:txFillClrLst>
+    <dgm:txEffectClrLst/>
+  </dgm:styleLbl>
+  <dgm:styleLbl name="bgAcc1">
+    <dgm:fillClrLst meth="repeat">
+      <a:schemeClr val="lt1">
+        <a:alpha val="90000"/>
+      </a:schemeClr>
+    </dgm:fillClrLst>
+    <dgm:linClrLst>
+      <a:schemeClr val="accent4"/>
+      <a:schemeClr val="accent5"/>
+    </dgm:linClrLst>
+    <dgm:effectClrLst/>
+    <dgm:txLinClrLst/>
+    <dgm:txFillClrLst meth="repeat">
+      <a:schemeClr val="dk1"/>
+    </dgm:txFillClrLst>
+    <dgm:txEffectClrLst/>
+  </dgm:styleLbl>
+  <dgm:styleLbl name="solidFgAcc1">
+    <dgm:fillClrLst meth="repeat">
+      <a:schemeClr val="lt1"/>
+    </dgm:fillClrLst>
+    <dgm:linClrLst>
+      <a:schemeClr val="accent4"/>
+      <a:schemeClr val="accent5"/>
+    </dgm:linClrLst>
+    <dgm:effectClrLst/>
+    <dgm:txLinClrLst/>
+    <dgm:txFillClrLst meth="repeat">
+      <a:schemeClr val="dk1"/>
+    </dgm:txFillClrLst>
+    <dgm:txEffectClrLst/>
+  </dgm:styleLbl>
+  <dgm:styleLbl name="solidAlignAcc1">
+    <dgm:fillClrLst meth="repeat">
+      <a:schemeClr val="lt1"/>
+    </dgm:fillClrLst>
+    <dgm:linClrLst>
+      <a:schemeClr val="accent4"/>
+      <a:schemeClr val="accent5"/>
+    </dgm:linClrLst>
+    <dgm:effectClrLst/>
+    <dgm:txLinClrLst/>
+    <dgm:txFillClrLst meth="repeat">
+      <a:schemeClr val="dk1"/>
+    </dgm:txFillClrLst>
+    <dgm:txEffectClrLst/>
+  </dgm:styleLbl>
+  <dgm:styleLbl name="solidBgAcc1">
+    <dgm:fillClrLst meth="repeat">
+      <a:schemeClr val="lt1"/>
+    </dgm:fillClrLst>
+    <dgm:linClrLst>
+      <a:schemeClr val="accent4"/>
+      <a:schemeClr val="accent5"/>
+    </dgm:linClrLst>
+    <dgm:effectClrLst/>
+    <dgm:txLinClrLst/>
+    <dgm:txFillClrLst meth="repeat">
+      <a:schemeClr val="dk1"/>
+    </dgm:txFillClrLst>
+    <dgm:txEffectClrLst/>
+  </dgm:styleLbl>
+  <dgm:styleLbl name="fgAccFollowNode1">
+    <dgm:fillClrLst>
+      <a:schemeClr val="accent4">
+        <a:tint val="40000"/>
+        <a:alpha val="90000"/>
+      </a:schemeClr>
+      <a:schemeClr val="accent5">
+        <a:tint val="40000"/>
+        <a:alpha val="90000"/>
+      </a:schemeClr>
+    </dgm:fillClrLst>
+    <dgm:linClrLst>
+      <a:schemeClr val="accent4">
+        <a:tint val="40000"/>
+        <a:alpha val="90000"/>
+      </a:schemeClr>
+      <a:schemeClr val="accent5">
+        <a:tint val="40000"/>
+        <a:alpha val="90000"/>
+      </a:schemeClr>
+    </dgm:linClrLst>
+    <dgm:effectClrLst/>
+    <dgm:txLinClrLst/>
+    <dgm:txFillClrLst meth="repeat">
+      <a:schemeClr val="dk1"/>
+    </dgm:txFillClrLst>
+    <dgm:txEffectClrLst/>
+  </dgm:styleLbl>
+  <dgm:styleLbl name="alignAccFollowNode1">
+    <dgm:fillClrLst>
+      <a:schemeClr val="accent4">
+        <a:tint val="40000"/>
+        <a:alpha val="90000"/>
+      </a:schemeClr>
+      <a:schemeClr val="accent5">
+        <a:tint val="40000"/>
+        <a:alpha val="90000"/>
+      </a:schemeClr>
+    </dgm:fillClrLst>
+    <dgm:linClrLst>
+      <a:schemeClr val="accent4">
+        <a:tint val="40000"/>
+        <a:alpha val="90000"/>
+      </a:schemeClr>
+      <a:schemeClr val="accent5">
+        <a:tint val="40000"/>
+        <a:alpha val="90000"/>
+      </a:schemeClr>
+    </dgm:linClrLst>
+    <dgm:effectClrLst/>
+    <dgm:txLinClrLst/>
+    <dgm:txFillClrLst meth="repeat">
+      <a:schemeClr val="dk1"/>
+    </dgm:txFillClrLst>
+    <dgm:txEffectClrLst/>
+  </dgm:styleLbl>
+  <dgm:styleLbl name="bgAccFollowNode1">
+    <dgm:fillClrLst>
+      <a:schemeClr val="accent4">
+        <a:tint val="40000"/>
+        <a:alpha val="90000"/>
+      </a:schemeClr>
+      <a:schemeClr val="accent5">
+        <a:tint val="40000"/>
+        <a:alpha val="90000"/>
+      </a:schemeClr>
+    </dgm:fillClrLst>
+    <dgm:linClrLst>
+      <a:schemeClr val="accent4">
+        <a:tint val="40000"/>
+        <a:alpha val="90000"/>
+      </a:schemeClr>
+      <a:schemeClr val="accent5">
+        <a:tint val="40000"/>
+        <a:alpha val="90000"/>
+      </a:schemeClr>
+    </dgm:linClrLst>
+    <dgm:effectClrLst/>
+    <dgm:txLinClrLst/>
+    <dgm:txFillClrLst meth="repeat">
+      <a:schemeClr val="dk1"/>
+    </dgm:txFillClrLst>
+    <dgm:txEffectClrLst/>
+  </dgm:styleLbl>
+  <dgm:styleLbl name="fgAcc0">
+    <dgm:fillClrLst meth="repeat">
+      <a:schemeClr val="lt1">
+        <a:alpha val="90000"/>
+      </a:schemeClr>
+    </dgm:fillClrLst>
+    <dgm:linClrLst>
+      <a:schemeClr val="accent3"/>
+    </dgm:linClrLst>
+    <dgm:effectClrLst/>
+    <dgm:txLinClrLst/>
+    <dgm:txFillClrLst meth="repeat">
+      <a:schemeClr val="dk1"/>
+    </dgm:txFillClrLst>
+    <dgm:txEffectClrLst/>
+  </dgm:styleLbl>
+  <dgm:styleLbl name="fgAcc2">
+    <dgm:fillClrLst meth="repeat">
+      <a:schemeClr val="lt1">
+        <a:alpha val="90000"/>
+      </a:schemeClr>
+    </dgm:fillClrLst>
+    <dgm:linClrLst>
+      <a:schemeClr val="accent5"/>
+    </dgm:linClrLst>
+    <dgm:effectClrLst/>
+    <dgm:txLinClrLst/>
+    <dgm:txFillClrLst meth="repeat">
+      <a:schemeClr val="dk1"/>
+    </dgm:txFillClrLst>
+    <dgm:txEffectClrLst/>
+  </dgm:styleLbl>
+  <dgm:styleLbl name="fgAcc3">
+    <dgm:fillClrLst meth="repeat">
+      <a:schemeClr val="lt1">
+        <a:alpha val="90000"/>
+      </a:schemeClr>
+    </dgm:fillClrLst>
+    <dgm:linClrLst>
+      <a:schemeClr val="accent6"/>
+    </dgm:linClrLst>
+    <dgm:effectClrLst/>
+    <dgm:txLinClrLst/>
+    <dgm:txFillClrLst meth="repeat">
+      <a:schemeClr val="dk1"/>
+    </dgm:txFillClrLst>
+    <dgm:txEffectClrLst/>
+  </dgm:styleLbl>
+  <dgm:styleLbl name="fgAcc4">
+    <dgm:fillClrLst meth="repeat">
+      <a:schemeClr val="lt1">
+        <a:alpha val="90000"/>
+      </a:schemeClr>
+    </dgm:fillClrLst>
+    <dgm:linClrLst>
+      <a:schemeClr val="accent1"/>
+    </dgm:linClrLst>
+    <dgm:effectClrLst/>
+    <dgm:txLinClrLst/>
+    <dgm:txFillClrLst meth="repeat">
+      <a:schemeClr val="dk1"/>
+    </dgm:txFillClrLst>
+    <dgm:txEffectClrLst/>
+  </dgm:styleLbl>
+  <dgm:styleLbl name="bgShp">
+    <dgm:fillClrLst meth="repeat">
+      <a:schemeClr val="accent4">
+        <a:tint val="40000"/>
+      </a:schemeClr>
+    </dgm:fillClrLst>
+    <dgm:linClrLst meth="repeat">
+      <a:schemeClr val="dk1"/>
+    </dgm:linClrLst>
+    <dgm:effectClrLst/>
+    <dgm:txLinClrLst/>
+    <dgm:txFillClrLst meth="repeat">
+      <a:schemeClr val="dk1"/>
+    </dgm:txFillClrLst>
+    <dgm:txEffectClrLst/>
+  </dgm:styleLbl>
+  <dgm:styleLbl name="dkBgShp">
+    <dgm:fillClrLst meth="repeat">
+      <a:schemeClr val="accent4">
+        <a:shade val="90000"/>
+      </a:schemeClr>
+    </dgm:fillClrLst>
+    <dgm:linClrLst meth="repeat">
+      <a:schemeClr val="dk1"/>
+    </dgm:linClrLst>
+    <dgm:effectClrLst/>
+    <dgm:txLinClrLst/>
+    <dgm:txFillClrLst meth="repeat">
+      <a:schemeClr val="lt1"/>
+    </dgm:txFillClrLst>
+    <dgm:txEffectClrLst/>
+  </dgm:styleLbl>
+  <dgm:styleLbl name="trBgShp">
+    <dgm:fillClrLst meth="repeat">
+      <a:schemeClr val="accent4">
+        <a:tint val="50000"/>
+        <a:alpha val="40000"/>
+      </a:schemeClr>
+    </dgm:fillClrLst>
+    <dgm:linClrLst meth="repeat">
+      <a:schemeClr val="accent4"/>
+    </dgm:linClrLst>
+    <dgm:effectClrLst/>
+    <dgm:txLinClrLst/>
+    <dgm:txFillClrLst meth="repeat">
+      <a:schemeClr val="lt1"/>
+    </dgm:txFillClrLst>
+    <dgm:txEffectClrLst/>
+  </dgm:styleLbl>
+  <dgm:styleLbl name="fgShp">
+    <dgm:fillClrLst meth="repeat">
+      <a:schemeClr val="accent4">
+        <a:tint val="40000"/>
+      </a:schemeClr>
+    </dgm:fillClrLst>
+    <dgm:linClrLst meth="repeat">
+      <a:schemeClr val="lt1"/>
+    </dgm:linClrLst>
+    <dgm:effectClrLst/>
+    <dgm:txLinClrLst/>
+    <dgm:txFillClrLst meth="repeat">
+      <a:schemeClr val="dk1"/>
+    </dgm:txFillClrLst>
+    <dgm:txEffectClrLst/>
+  </dgm:styleLbl>
+  <dgm:styleLbl name="revTx">
+    <dgm:fillClrLst meth="repeat">
+      <a:schemeClr val="lt1">
+        <a:alpha val="0"/>
+      </a:schemeClr>
+    </dgm:fillClrLst>
+    <dgm:linClrLst meth="repeat">
+      <a:schemeClr val="dk1">
+        <a:alpha val="0"/>
+      </a:schemeClr>
+    </dgm:linClrLst>
+    <dgm:effectClrLst/>
+    <dgm:txLinClrLst/>
+    <dgm:txFillClrLst meth="repeat">
+      <a:schemeClr val="tx1"/>
+    </dgm:txFillClrLst>
+    <dgm:txEffectClrLst/>
+  </dgm:styleLbl>
+</dgm:colorsDef>
+</file>
+
+<file path=ppt/diagrams/data1.xml><?xml version="1.0" encoding="utf-8"?>
+<dgm:dataModel xmlns:dgm="http://schemas.openxmlformats.org/drawingml/2006/diagram" xmlns:a="http://schemas.openxmlformats.org/drawingml/2006/main">
+  <dgm:ptLst>
+    <dgm:pt modelId="{9EEDDD01-3A3A-364A-B25C-93C97B36822F}" type="doc">
+      <dgm:prSet loTypeId="urn:microsoft.com/office/officeart/2005/8/layout/venn1" loCatId="" qsTypeId="urn:microsoft.com/office/officeart/2005/8/quickstyle/simple1" qsCatId="simple" csTypeId="urn:microsoft.com/office/officeart/2005/8/colors/colorful4" csCatId="colorful" phldr="1"/>
+      <dgm:spPr/>
+    </dgm:pt>
+    <dgm:pt modelId="{B6B676CA-3173-F84A-B5B7-321AD471F943}">
+      <dgm:prSet phldrT="[Text]" custT="1"/>
+      <dgm:spPr>
+        <a:solidFill>
+          <a:srgbClr val="92D050">
+            <a:alpha val="50000"/>
+          </a:srgbClr>
+        </a:solidFill>
+      </dgm:spPr>
+      <dgm:t>
+        <a:bodyPr/>
+        <a:lstStyle/>
+        <a:p>
+          <a:r>
+            <a:rPr lang="en-DE" sz="2000" b="1" i="0" dirty="0">
+              <a:latin typeface="Microsoft YaHei UI" panose="020B0503020204020204" pitchFamily="34" charset="-122"/>
+              <a:ea typeface="Microsoft YaHei UI" panose="020B0503020204020204" pitchFamily="34" charset="-122"/>
+            </a:rPr>
+            <a:t>2.009.677</a:t>
+          </a:r>
+          <a:endParaRPr lang="en-GB" sz="2400" b="1" i="0" dirty="0">
+            <a:latin typeface="Microsoft YaHei UI" panose="020B0503020204020204" pitchFamily="34" charset="-122"/>
+            <a:ea typeface="Microsoft YaHei UI" panose="020B0503020204020204" pitchFamily="34" charset="-122"/>
+          </a:endParaRPr>
+        </a:p>
+      </dgm:t>
+    </dgm:pt>
+    <dgm:pt modelId="{9D39045A-0D1E-724E-A9D1-088D05158CFB}" type="parTrans" cxnId="{5A16D8A4-2E91-2442-8892-5A0BC4EDFB60}">
+      <dgm:prSet/>
+      <dgm:spPr/>
+      <dgm:t>
+        <a:bodyPr/>
+        <a:lstStyle/>
+        <a:p>
+          <a:endParaRPr lang="en-GB"/>
+        </a:p>
+      </dgm:t>
+    </dgm:pt>
+    <dgm:pt modelId="{F4EC1083-30B0-1742-95C8-12FDCD644C50}" type="sibTrans" cxnId="{5A16D8A4-2E91-2442-8892-5A0BC4EDFB60}">
+      <dgm:prSet/>
+      <dgm:spPr/>
+      <dgm:t>
+        <a:bodyPr/>
+        <a:lstStyle/>
+        <a:p>
+          <a:endParaRPr lang="en-GB"/>
+        </a:p>
+      </dgm:t>
+    </dgm:pt>
+    <dgm:pt modelId="{7E4FFF5B-83A4-574B-8B53-B67E63DF91FA}">
+      <dgm:prSet phldrT="[Text]" custT="1"/>
+      <dgm:spPr>
+        <a:solidFill>
+          <a:srgbClr val="00B050">
+            <a:alpha val="50000"/>
+          </a:srgbClr>
+        </a:solidFill>
+      </dgm:spPr>
+      <dgm:t>
+        <a:bodyPr/>
+        <a:lstStyle/>
+        <a:p>
+          <a:r>
+            <a:rPr lang="en-DE" sz="2000" b="1" i="0" dirty="0">
+              <a:latin typeface="Microsoft YaHei UI" panose="020B0503020204020204" pitchFamily="34" charset="-122"/>
+              <a:ea typeface="Microsoft YaHei UI" panose="020B0503020204020204" pitchFamily="34" charset="-122"/>
+            </a:rPr>
+            <a:t>842.686</a:t>
+          </a:r>
+          <a:endParaRPr lang="en-GB" sz="2000" b="1" i="0" dirty="0">
+            <a:latin typeface="Microsoft YaHei UI" panose="020B0503020204020204" pitchFamily="34" charset="-122"/>
+            <a:ea typeface="Microsoft YaHei UI" panose="020B0503020204020204" pitchFamily="34" charset="-122"/>
+          </a:endParaRPr>
+        </a:p>
+      </dgm:t>
+    </dgm:pt>
+    <dgm:pt modelId="{368AF71C-6CBC-CB4D-ADC4-3F33B65FDCCC}" type="parTrans" cxnId="{57A43F4E-4BBF-0C47-BCB2-B48C0C37CB78}">
+      <dgm:prSet/>
+      <dgm:spPr/>
+      <dgm:t>
+        <a:bodyPr/>
+        <a:lstStyle/>
+        <a:p>
+          <a:endParaRPr lang="en-GB"/>
+        </a:p>
+      </dgm:t>
+    </dgm:pt>
+    <dgm:pt modelId="{BAA1DA63-09CF-EF45-831B-1974F45EADBA}" type="sibTrans" cxnId="{57A43F4E-4BBF-0C47-BCB2-B48C0C37CB78}">
+      <dgm:prSet/>
+      <dgm:spPr/>
+      <dgm:t>
+        <a:bodyPr/>
+        <a:lstStyle/>
+        <a:p>
+          <a:endParaRPr lang="en-GB"/>
+        </a:p>
+      </dgm:t>
+    </dgm:pt>
+    <dgm:pt modelId="{E82D838E-DFA3-E643-8C99-62FDB6714999}" type="pres">
+      <dgm:prSet presAssocID="{9EEDDD01-3A3A-364A-B25C-93C97B36822F}" presName="compositeShape" presStyleCnt="0">
+        <dgm:presLayoutVars>
+          <dgm:chMax val="7"/>
+          <dgm:dir/>
+          <dgm:resizeHandles val="exact"/>
+        </dgm:presLayoutVars>
+      </dgm:prSet>
+      <dgm:spPr/>
+    </dgm:pt>
+    <dgm:pt modelId="{9E1FBEDD-CF24-B848-BF2F-C108BF5188A2}" type="pres">
+      <dgm:prSet presAssocID="{B6B676CA-3173-F84A-B5B7-321AD471F943}" presName="circ1" presStyleLbl="vennNode1" presStyleIdx="0" presStyleCnt="2" custScaleX="91989" custScaleY="91989" custLinFactNeighborX="-487" custLinFactNeighborY="-3568"/>
+      <dgm:spPr/>
+    </dgm:pt>
+    <dgm:pt modelId="{B99DB8B9-B512-9B4D-A823-02A1C757A3A2}" type="pres">
+      <dgm:prSet presAssocID="{B6B676CA-3173-F84A-B5B7-321AD471F943}" presName="circ1Tx" presStyleLbl="revTx" presStyleIdx="0" presStyleCnt="0">
+        <dgm:presLayoutVars>
+          <dgm:chMax val="0"/>
+          <dgm:chPref val="0"/>
+          <dgm:bulletEnabled val="1"/>
+        </dgm:presLayoutVars>
+      </dgm:prSet>
+      <dgm:spPr/>
+    </dgm:pt>
+    <dgm:pt modelId="{D8C10D8C-DC9A-F646-9143-86FD5BD0F9CE}" type="pres">
+      <dgm:prSet presAssocID="{7E4FFF5B-83A4-574B-8B53-B67E63DF91FA}" presName="circ2" presStyleLbl="vennNode1" presStyleIdx="1" presStyleCnt="2" custScaleX="68992" custScaleY="68992" custLinFactNeighborX="-7139" custLinFactNeighborY="-3686"/>
+      <dgm:spPr/>
+    </dgm:pt>
+    <dgm:pt modelId="{9D6172E9-974B-1842-8840-99FFD6749ABA}" type="pres">
+      <dgm:prSet presAssocID="{7E4FFF5B-83A4-574B-8B53-B67E63DF91FA}" presName="circ2Tx" presStyleLbl="revTx" presStyleIdx="0" presStyleCnt="0">
+        <dgm:presLayoutVars>
+          <dgm:chMax val="0"/>
+          <dgm:chPref val="0"/>
+          <dgm:bulletEnabled val="1"/>
+        </dgm:presLayoutVars>
+      </dgm:prSet>
+      <dgm:spPr/>
+    </dgm:pt>
+  </dgm:ptLst>
+  <dgm:cxnLst>
+    <dgm:cxn modelId="{7FD3F347-71B0-8B4F-BC0B-5855C6CF49E6}" type="presOf" srcId="{9EEDDD01-3A3A-364A-B25C-93C97B36822F}" destId="{E82D838E-DFA3-E643-8C99-62FDB6714999}" srcOrd="0" destOrd="0" presId="urn:microsoft.com/office/officeart/2005/8/layout/venn1"/>
+    <dgm:cxn modelId="{57A43F4E-4BBF-0C47-BCB2-B48C0C37CB78}" srcId="{9EEDDD01-3A3A-364A-B25C-93C97B36822F}" destId="{7E4FFF5B-83A4-574B-8B53-B67E63DF91FA}" srcOrd="1" destOrd="0" parTransId="{368AF71C-6CBC-CB4D-ADC4-3F33B65FDCCC}" sibTransId="{BAA1DA63-09CF-EF45-831B-1974F45EADBA}"/>
+    <dgm:cxn modelId="{1B7B0C56-5E43-CA48-AF08-6C9AE357347F}" type="presOf" srcId="{B6B676CA-3173-F84A-B5B7-321AD471F943}" destId="{9E1FBEDD-CF24-B848-BF2F-C108BF5188A2}" srcOrd="0" destOrd="0" presId="urn:microsoft.com/office/officeart/2005/8/layout/venn1"/>
+    <dgm:cxn modelId="{3426668A-8D16-7C4E-91F6-E33CA3438184}" type="presOf" srcId="{7E4FFF5B-83A4-574B-8B53-B67E63DF91FA}" destId="{D8C10D8C-DC9A-F646-9143-86FD5BD0F9CE}" srcOrd="0" destOrd="0" presId="urn:microsoft.com/office/officeart/2005/8/layout/venn1"/>
+    <dgm:cxn modelId="{5A16D8A4-2E91-2442-8892-5A0BC4EDFB60}" srcId="{9EEDDD01-3A3A-364A-B25C-93C97B36822F}" destId="{B6B676CA-3173-F84A-B5B7-321AD471F943}" srcOrd="0" destOrd="0" parTransId="{9D39045A-0D1E-724E-A9D1-088D05158CFB}" sibTransId="{F4EC1083-30B0-1742-95C8-12FDCD644C50}"/>
+    <dgm:cxn modelId="{D8712CBF-4A3B-4C46-8D0D-3FE5645C9D0C}" type="presOf" srcId="{7E4FFF5B-83A4-574B-8B53-B67E63DF91FA}" destId="{9D6172E9-974B-1842-8840-99FFD6749ABA}" srcOrd="1" destOrd="0" presId="urn:microsoft.com/office/officeart/2005/8/layout/venn1"/>
+    <dgm:cxn modelId="{A6069CC9-FBC0-F344-AD99-8854623870E5}" type="presOf" srcId="{B6B676CA-3173-F84A-B5B7-321AD471F943}" destId="{B99DB8B9-B512-9B4D-A823-02A1C757A3A2}" srcOrd="1" destOrd="0" presId="urn:microsoft.com/office/officeart/2005/8/layout/venn1"/>
+    <dgm:cxn modelId="{91E9FFF6-B2D6-FE40-9BE8-F07975CAE479}" type="presParOf" srcId="{E82D838E-DFA3-E643-8C99-62FDB6714999}" destId="{9E1FBEDD-CF24-B848-BF2F-C108BF5188A2}" srcOrd="0" destOrd="0" presId="urn:microsoft.com/office/officeart/2005/8/layout/venn1"/>
+    <dgm:cxn modelId="{DE544817-D770-584C-ACE8-59E31CD3648F}" type="presParOf" srcId="{E82D838E-DFA3-E643-8C99-62FDB6714999}" destId="{B99DB8B9-B512-9B4D-A823-02A1C757A3A2}" srcOrd="1" destOrd="0" presId="urn:microsoft.com/office/officeart/2005/8/layout/venn1"/>
+    <dgm:cxn modelId="{64E25A75-69DD-9B4F-8D55-992EEABB918F}" type="presParOf" srcId="{E82D838E-DFA3-E643-8C99-62FDB6714999}" destId="{D8C10D8C-DC9A-F646-9143-86FD5BD0F9CE}" srcOrd="2" destOrd="0" presId="urn:microsoft.com/office/officeart/2005/8/layout/venn1"/>
+    <dgm:cxn modelId="{B9A63F89-25C4-3C47-9BBD-2EC6B5091E7A}" type="presParOf" srcId="{E82D838E-DFA3-E643-8C99-62FDB6714999}" destId="{9D6172E9-974B-1842-8840-99FFD6749ABA}" srcOrd="3" destOrd="0" presId="urn:microsoft.com/office/officeart/2005/8/layout/venn1"/>
+  </dgm:cxnLst>
+  <dgm:bg/>
+  <dgm:whole/>
+  <dgm:extLst>
+    <a:ext uri="http://schemas.microsoft.com/office/drawing/2008/diagram">
+      <dsp:dataModelExt xmlns:dsp="http://schemas.microsoft.com/office/drawing/2008/diagram" relId="rId7" minVer="http://schemas.openxmlformats.org/drawingml/2006/diagram"/>
+    </a:ext>
+    <a:ext uri="{C62137D5-CB1D-491B-B009-E17868A290BF}">
+      <dgm14:recolorImg xmlns:dgm14="http://schemas.microsoft.com/office/drawing/2010/diagram" val="1"/>
+    </a:ext>
+  </dgm:extLst>
+</dgm:dataModel>
+</file>
+
+<file path=ppt/diagrams/drawing1.xml><?xml version="1.0" encoding="utf-8"?>
+<dsp:drawing xmlns:dgm="http://schemas.openxmlformats.org/drawingml/2006/diagram" xmlns:dsp="http://schemas.microsoft.com/office/drawing/2008/diagram" xmlns:a="http://schemas.openxmlformats.org/drawingml/2006/main">
+  <dsp:spTree>
+    <dsp:nvGrpSpPr>
+      <dsp:cNvPr id="0" name=""/>
+      <dsp:cNvGrpSpPr/>
+    </dsp:nvGrpSpPr>
+    <dsp:grpSpPr/>
+    <dsp:sp modelId="{9E1FBEDD-CF24-B848-BF2F-C108BF5188A2}">
+      <dsp:nvSpPr>
+        <dsp:cNvPr id="0" name=""/>
+        <dsp:cNvSpPr/>
+      </dsp:nvSpPr>
+      <dsp:spPr>
+        <a:xfrm>
+          <a:off x="417081" y="302874"/>
+          <a:ext cx="2880005" cy="2880005"/>
+        </a:xfrm>
+        <a:prstGeom prst="ellipse">
+          <a:avLst/>
+        </a:prstGeom>
+        <a:solidFill>
+          <a:srgbClr val="92D050">
+            <a:alpha val="50000"/>
+          </a:srgbClr>
+        </a:solidFill>
+        <a:ln w="12700" cap="flat" cmpd="sng" algn="ctr">
+          <a:solidFill>
+            <a:schemeClr val="lt1">
+              <a:hueOff val="0"/>
+              <a:satOff val="0"/>
+              <a:lumOff val="0"/>
+              <a:alphaOff val="0"/>
+            </a:schemeClr>
+          </a:solidFill>
+          <a:prstDash val="solid"/>
+          <a:miter lim="800000"/>
+        </a:ln>
+        <a:effectLst/>
+      </dsp:spPr>
+      <dsp:style>
+        <a:lnRef idx="2">
+          <a:scrgbClr r="0" g="0" b="0"/>
+        </a:lnRef>
+        <a:fillRef idx="1">
+          <a:scrgbClr r="0" g="0" b="0"/>
+        </a:fillRef>
+        <a:effectRef idx="0">
+          <a:scrgbClr r="0" g="0" b="0"/>
+        </a:effectRef>
+        <a:fontRef idx="minor">
+          <a:schemeClr val="tx1"/>
+        </a:fontRef>
+      </dsp:style>
+      <dsp:txBody>
+        <a:bodyPr spcFirstLastPara="0" vert="horz" wrap="square" lIns="0" tIns="0" rIns="0" bIns="0" numCol="1" spcCol="1270" anchor="ctr" anchorCtr="0">
+          <a:noAutofit/>
+        </a:bodyPr>
+        <a:lstStyle/>
+        <a:p>
+          <a:pPr marL="0" lvl="0" indent="0" algn="ctr" defTabSz="889000">
+            <a:lnSpc>
+              <a:spcPct val="90000"/>
+            </a:lnSpc>
+            <a:spcBef>
+              <a:spcPct val="0"/>
+            </a:spcBef>
+            <a:spcAft>
+              <a:spcPct val="35000"/>
+            </a:spcAft>
+            <a:buNone/>
+          </a:pPr>
+          <a:r>
+            <a:rPr lang="en-DE" sz="2000" b="1" i="0" kern="1200" dirty="0">
+              <a:latin typeface="Microsoft YaHei UI" panose="020B0503020204020204" pitchFamily="34" charset="-122"/>
+              <a:ea typeface="Microsoft YaHei UI" panose="020B0503020204020204" pitchFamily="34" charset="-122"/>
+            </a:rPr>
+            <a:t>2.009.677</a:t>
+          </a:r>
+          <a:endParaRPr lang="en-GB" sz="2400" b="1" i="0" kern="1200" dirty="0">
+            <a:latin typeface="Microsoft YaHei UI" panose="020B0503020204020204" pitchFamily="34" charset="-122"/>
+            <a:ea typeface="Microsoft YaHei UI" panose="020B0503020204020204" pitchFamily="34" charset="-122"/>
+          </a:endParaRPr>
+        </a:p>
+      </dsp:txBody>
+      <dsp:txXfrm>
+        <a:off x="819244" y="642488"/>
+        <a:ext cx="1660543" cy="2200776"/>
+      </dsp:txXfrm>
+    </dsp:sp>
+    <dsp:sp modelId="{D8C10D8C-DC9A-F646-9143-86FD5BD0F9CE}">
+      <dsp:nvSpPr>
+        <dsp:cNvPr id="0" name=""/>
+        <dsp:cNvSpPr/>
+      </dsp:nvSpPr>
+      <dsp:spPr>
+        <a:xfrm>
+          <a:off x="2825259" y="659176"/>
+          <a:ext cx="2160012" cy="2160012"/>
+        </a:xfrm>
+        <a:prstGeom prst="ellipse">
+          <a:avLst/>
+        </a:prstGeom>
+        <a:solidFill>
+          <a:srgbClr val="00B050">
+            <a:alpha val="50000"/>
+          </a:srgbClr>
+        </a:solidFill>
+        <a:ln w="12700" cap="flat" cmpd="sng" algn="ctr">
+          <a:solidFill>
+            <a:schemeClr val="lt1">
+              <a:hueOff val="0"/>
+              <a:satOff val="0"/>
+              <a:lumOff val="0"/>
+              <a:alphaOff val="0"/>
+            </a:schemeClr>
+          </a:solidFill>
+          <a:prstDash val="solid"/>
+          <a:miter lim="800000"/>
+        </a:ln>
+        <a:effectLst/>
+      </dsp:spPr>
+      <dsp:style>
+        <a:lnRef idx="2">
+          <a:scrgbClr r="0" g="0" b="0"/>
+        </a:lnRef>
+        <a:fillRef idx="1">
+          <a:scrgbClr r="0" g="0" b="0"/>
+        </a:fillRef>
+        <a:effectRef idx="0">
+          <a:scrgbClr r="0" g="0" b="0"/>
+        </a:effectRef>
+        <a:fontRef idx="minor">
+          <a:schemeClr val="tx1"/>
+        </a:fontRef>
+      </dsp:style>
+      <dsp:txBody>
+        <a:bodyPr spcFirstLastPara="0" vert="horz" wrap="square" lIns="0" tIns="0" rIns="0" bIns="0" numCol="1" spcCol="1270" anchor="ctr" anchorCtr="0">
+          <a:noAutofit/>
+        </a:bodyPr>
+        <a:lstStyle/>
+        <a:p>
+          <a:pPr marL="0" lvl="0" indent="0" algn="ctr" defTabSz="889000">
+            <a:lnSpc>
+              <a:spcPct val="90000"/>
+            </a:lnSpc>
+            <a:spcBef>
+              <a:spcPct val="0"/>
+            </a:spcBef>
+            <a:spcAft>
+              <a:spcPct val="35000"/>
+            </a:spcAft>
+            <a:buNone/>
+          </a:pPr>
+          <a:r>
+            <a:rPr lang="en-DE" sz="2000" b="1" i="0" kern="1200" dirty="0">
+              <a:latin typeface="Microsoft YaHei UI" panose="020B0503020204020204" pitchFamily="34" charset="-122"/>
+              <a:ea typeface="Microsoft YaHei UI" panose="020B0503020204020204" pitchFamily="34" charset="-122"/>
+            </a:rPr>
+            <a:t>842.686</a:t>
+          </a:r>
+          <a:endParaRPr lang="en-GB" sz="2000" b="1" i="0" kern="1200" dirty="0">
+            <a:latin typeface="Microsoft YaHei UI" panose="020B0503020204020204" pitchFamily="34" charset="-122"/>
+            <a:ea typeface="Microsoft YaHei UI" panose="020B0503020204020204" pitchFamily="34" charset="-122"/>
+          </a:endParaRPr>
+        </a:p>
+      </dsp:txBody>
+      <dsp:txXfrm>
+        <a:off x="3438236" y="913888"/>
+        <a:ext cx="1245412" cy="1650588"/>
+      </dsp:txXfrm>
+    </dsp:sp>
+  </dsp:spTree>
+</dsp:drawing>
+</file>
+
+<file path=ppt/diagrams/layout1.xml><?xml version="1.0" encoding="utf-8"?>
+<dgm:layoutDef xmlns:dgm="http://schemas.openxmlformats.org/drawingml/2006/diagram" xmlns:a="http://schemas.openxmlformats.org/drawingml/2006/main" uniqueId="urn:microsoft.com/office/officeart/2005/8/layout/venn1">
+  <dgm:title val=""/>
+  <dgm:desc val=""/>
+  <dgm:catLst>
+    <dgm:cat type="relationship" pri="28000"/>
+    <dgm:cat type="convert" pri="19000"/>
+  </dgm:catLst>
+  <dgm:sampData useDef="1">
+    <dgm:dataModel>
+      <dgm:ptLst/>
+      <dgm:bg/>
+      <dgm:whole/>
+    </dgm:dataModel>
+  </dgm:sampData>
+  <dgm:styleData useDef="1">
+    <dgm:dataModel>
+      <dgm:ptLst/>
+      <dgm:bg/>
+      <dgm:whole/>
+    </dgm:dataModel>
+  </dgm:styleData>
+  <dgm:clrData>
+    <dgm:dataModel>
+      <dgm:ptLst>
+        <dgm:pt modelId="0" type="doc"/>
+        <dgm:pt modelId="1"/>
+        <dgm:pt modelId="2"/>
+        <dgm:pt modelId="3"/>
+        <dgm:pt modelId="4"/>
+      </dgm:ptLst>
+      <dgm:cxnLst>
+        <dgm:cxn modelId="7" srcId="0" destId="1" srcOrd="0" destOrd="0"/>
+        <dgm:cxn modelId="8" srcId="0" destId="2" srcOrd="1" destOrd="0"/>
+        <dgm:cxn modelId="9" srcId="0" destId="3" srcOrd="2" destOrd="0"/>
+        <dgm:cxn modelId="10" srcId="0" destId="4" srcOrd="3" destOrd="0"/>
+      </dgm:cxnLst>
+      <dgm:bg/>
+      <dgm:whole/>
+    </dgm:dataModel>
+  </dgm:clrData>
+  <dgm:layoutNode name="compositeShape">
+    <dgm:varLst>
+      <dgm:chMax val="7"/>
+      <dgm:dir/>
+      <dgm:resizeHandles val="exact"/>
+    </dgm:varLst>
+    <dgm:choose name="Name0">
+      <dgm:if name="Name1" axis="ch" ptType="node" func="cnt" op="equ" val="1">
+        <dgm:alg type="composite">
+          <dgm:param type="ar" val="1"/>
+        </dgm:alg>
+      </dgm:if>
+      <dgm:if name="Name2" axis="ch" ptType="node" func="cnt" op="equ" val="2">
+        <dgm:alg type="composite">
+          <dgm:param type="ar" val="1.792"/>
+        </dgm:alg>
+      </dgm:if>
+      <dgm:if name="Name3" axis="ch" ptType="node" func="cnt" op="equ" val="3">
+        <dgm:alg type="composite">
+          <dgm:param type="ar" val="1"/>
+        </dgm:alg>
+      </dgm:if>
+      <dgm:if name="Name4" axis="ch" ptType="node" func="cnt" op="equ" val="4">
+        <dgm:alg type="composite">
+          <dgm:param type="ar" val="1"/>
+        </dgm:alg>
+      </dgm:if>
+      <dgm:if name="Name5" axis="ch" ptType="node" func="cnt" op="equ" val="5">
+        <dgm:alg type="composite">
+          <dgm:param type="ar" val="1.4"/>
+        </dgm:alg>
+      </dgm:if>
+      <dgm:if name="Name6" axis="ch" ptType="node" func="cnt" op="equ" val="6">
+        <dgm:alg type="composite">
+          <dgm:param type="ar" val="1.285"/>
+        </dgm:alg>
+      </dgm:if>
+      <dgm:if name="Name7" axis="ch" ptType="node" func="cnt" op="equ" val="7">
+        <dgm:alg type="composite">
+          <dgm:param type="ar" val="1.359"/>
+        </dgm:alg>
+      </dgm:if>
+      <dgm:else name="Name8">
+        <dgm:alg type="composite">
+          <dgm:param type="ar" val="1.359"/>
+        </dgm:alg>
+      </dgm:else>
+    </dgm:choose>
+    <dgm:shape xmlns:r="http://schemas.openxmlformats.org/officeDocument/2006/relationships" r:blip="">
+      <dgm:adjLst/>
+    </dgm:shape>
+    <dgm:presOf/>
+    <dgm:choose name="Name9">
+      <dgm:if name="Name10" axis="ch" ptType="node" func="cnt" op="equ" val="1">
+        <dgm:constrLst>
+          <dgm:constr type="ctrX" for="ch" forName="circ1TxSh" refType="w" fact="0.5"/>
+          <dgm:constr type="ctrY" for="ch" forName="circ1TxSh" refType="h" fact="0.5"/>
+          <dgm:constr type="w" for="ch" forName="circ1TxSh" refType="w"/>
+          <dgm:constr type="h" for="ch" forName="circ1TxSh" refType="h"/>
+          <dgm:constr type="primFontSz" for="ch" ptType="node" op="equ"/>
+        </dgm:constrLst>
+      </dgm:if>
+      <dgm:if name="Name11" axis="ch" ptType="node" func="cnt" op="equ" val="2">
+        <dgm:constrLst>
+          <dgm:constr type="ctrX" for="ch" forName="circ1" refType="w" fact="0.3"/>
+          <dgm:constr type="ctrY" for="ch" forName="circ1" refType="h" fact="0.5"/>
+          <dgm:constr type="w" for="ch" forName="circ1" refType="w" fact="0.555"/>
+          <dgm:constr type="h" for="ch" forName="circ1" refType="h" fact="0.99456"/>
+          <dgm:constr type="l" for="ch" forName="circ1Tx" refType="w" fact="0.1"/>
+          <dgm:constr type="t" for="ch" forName="circ1Tx" refType="h" fact="0.12"/>
+          <dgm:constr type="w" for="ch" forName="circ1Tx" refType="w" fact="0.32"/>
+          <dgm:constr type="h" for="ch" forName="circ1Tx" refType="h" fact="0.76"/>
+          <dgm:constr type="ctrX" for="ch" forName="circ2" refType="w" fact="0.7"/>
+          <dgm:constr type="ctrY" for="ch" forName="circ2" refType="h" fact="0.5"/>
+          <dgm:constr type="w" for="ch" forName="circ2" refType="w" fact="0.555"/>
+          <dgm:constr type="h" for="ch" forName="circ2" refType="h" fact="0.99456"/>
+          <dgm:constr type="l" for="ch" forName="circ2Tx" refType="w" fact="0.58"/>
+          <dgm:constr type="t" for="ch" forName="circ2Tx" refType="h" fact="0.12"/>
+          <dgm:constr type="w" for="ch" forName="circ2Tx" refType="w" fact="0.32"/>
+          <dgm:constr type="h" for="ch" forName="circ2Tx" refType="h" fact="0.76"/>
+          <dgm:constr type="primFontSz" for="ch" ptType="node" op="equ"/>
+        </dgm:constrLst>
+      </dgm:if>
+      <dgm:if name="Name12" axis="ch" ptType="node" func="cnt" op="equ" val="3">
+        <dgm:constrLst>
+          <dgm:constr type="ctrX" for="ch" forName="circ1" refType="w" fact="0.5"/>
+          <dgm:constr type="ctrY" for="ch" forName="circ1" refType="w" fact="0.25"/>
+          <dgm:constr type="w" for="ch" forName="circ1" refType="w" fact="0.6"/>
+          <dgm:constr type="h" for="ch" forName="circ1" refType="h" fact="0.6"/>
+          <dgm:constr type="l" for="ch" forName="circ1Tx" refType="w" fact="0.28"/>
+          <dgm:constr type="t" for="ch" forName="circ1Tx" refType="h" fact="0.055"/>
+          <dgm:constr type="w" for="ch" forName="circ1Tx" refType="w" fact="0.44"/>
+          <dgm:constr type="h" for="ch" forName="circ1Tx" refType="h" fact="0.27"/>
+          <dgm:constr type="ctrX" for="ch" forName="circ2" refType="w" fact="0.7165"/>
+          <dgm:constr type="ctrY" for="ch" forName="circ2" refType="w" fact="0.625"/>
+          <dgm:constr type="w" for="ch" forName="circ2" refType="w" fact="0.6"/>
+          <dgm:constr type="h" for="ch" forName="circ2" refType="h" fact="0.6"/>
+          <dgm:constr type="l" for="ch" forName="circ2Tx" refType="w" fact="0.6"/>
+          <dgm:constr type="t" for="ch" forName="circ2Tx" refType="h" fact="0.48"/>
+          <dgm:constr type="w" for="ch" forName="circ2Tx" refType="w" fact="0.36"/>
+          <dgm:constr type="h" for="ch" forName="circ2Tx" refType="h" fact="0.33"/>
+          <dgm:constr type="ctrX" for="ch" forName="circ3" refType="w" fact="0.2835"/>
+          <dgm:constr type="ctrY" for="ch" forName="circ3" refType="w" fact="0.625"/>
+          <dgm:constr type="w" for="ch" forName="circ3" refType="w" fact="0.6"/>
+          <dgm:constr type="h" for="ch" forName="circ3" refType="h" fact="0.6"/>
+          <dgm:constr type="l" for="ch" forName="circ3Tx" refType="w" fact="0.04"/>
+          <dgm:constr type="t" for="ch" forName="circ3Tx" refType="h" fact="0.48"/>
+          <dgm:constr type="w" for="ch" forName="circ3Tx" refType="w" fact="0.36"/>
+          <dgm:constr type="h" for="ch" forName="circ3Tx" refType="h" fact="0.33"/>
+          <dgm:constr type="primFontSz" for="ch" ptType="node" op="equ"/>
+        </dgm:constrLst>
+      </dgm:if>
+      <dgm:if name="Name13" axis="ch" ptType="node" func="cnt" op="equ" val="4">
+        <dgm:constrLst>
+          <dgm:constr type="ctrX" for="ch" forName="circ1" refType="w" fact="0.5"/>
+          <dgm:constr type="ctrY" for="ch" forName="circ1" refType="w" fact="0.27"/>
+          <dgm:constr type="w" for="ch" forName="circ1" refType="w" fact="0.52"/>
+          <dgm:constr type="h" for="ch" forName="circ1" refType="h" fact="0.52"/>
+          <dgm:constr type="l" for="ch" forName="circ1Tx" refType="w" fact="0.3"/>
+          <dgm:constr type="t" for="ch" forName="circ1Tx" refType="h" fact="0.08"/>
+          <dgm:constr type="w" for="ch" forName="circ1Tx" refType="w" fact="0.4"/>
+          <dgm:constr type="h" for="ch" forName="circ1Tx" refType="h" fact="0.165"/>
+          <dgm:constr type="ctrX" for="ch" forName="circ2" refType="w" fact="0.73"/>
+          <dgm:constr type="ctrY" for="ch" forName="circ2" refType="w" fact="0.5"/>
+          <dgm:constr type="w" for="ch" forName="circ2" refType="w" fact="0.52"/>
+          <dgm:constr type="h" for="ch" forName="circ2" refType="h" fact="0.52"/>
+          <dgm:constr type="r" for="ch" forName="circ2Tx" refType="w" fact="0.95"/>
+          <dgm:constr type="t" for="ch" forName="circ2Tx" refType="h" fact="0.3"/>
+          <dgm:constr type="w" for="ch" forName="circ2Tx" refType="w" fact="0.2"/>
+          <dgm:constr type="h" for="ch" forName="circ2Tx" refType="h" fact="0.4"/>
+          <dgm:constr type="ctrX" for="ch" forName="circ3" refType="w" fact="0.5"/>
+          <dgm:constr type="ctrY" for="ch" forName="circ3" refType="w" fact="0.73"/>
+          <dgm:constr type="w" for="ch" forName="circ3" refType="w" fact="0.52"/>
+          <dgm:constr type="h" for="ch" forName="circ3" refType="h" fact="0.52"/>
+          <dgm:constr type="l" for="ch" forName="circ3Tx" refType="w" fact="0.3"/>
+          <dgm:constr type="b" for="ch" forName="circ3Tx" refType="h" fact="0.92"/>
+          <dgm:constr type="w" for="ch" forName="circ3Tx" refType="w" fact="0.4"/>
+          <dgm:constr type="h" for="ch" forName="circ3Tx" refType="h" fact="0.165"/>
+          <dgm:constr type="ctrX" for="ch" forName="circ4" refType="w" fact="0.27"/>
+          <dgm:constr type="ctrY" for="ch" forName="circ4" refType="h" fact="0.5"/>
+          <dgm:constr type="w" for="ch" forName="circ4" refType="w" fact="0.52"/>
+          <dgm:constr type="h" for="ch" forName="circ4" refType="h" fact="0.52"/>
+          <dgm:constr type="l" for="ch" forName="circ4Tx" refType="w" fact="0.05"/>
+          <dgm:constr type="t" for="ch" forName="circ4Tx" refType="h" fact="0.3"/>
+          <dgm:constr type="w" for="ch" forName="circ4Tx" refType="w" fact="0.2"/>
+          <dgm:constr type="h" for="ch" forName="circ4Tx" refType="h" fact="0.4"/>
+          <dgm:constr type="primFontSz" for="ch" ptType="node" op="equ"/>
+        </dgm:constrLst>
+      </dgm:if>
+      <dgm:if name="Name14" axis="ch" ptType="node" func="cnt" op="equ" val="5">
+        <dgm:constrLst>
+          <dgm:constr type="ctrX" for="ch" forName="circ1" refType="w" fact="0.5"/>
+          <dgm:constr type="ctrY" for="ch" forName="circ1" refType="h" fact="0.46"/>
+          <dgm:constr type="w" for="ch" forName="circ1" refType="w" fact="0.25"/>
+          <dgm:constr type="h" for="ch" forName="circ1" refType="h" fact="0.35"/>
+          <dgm:constr type="l" for="ch" forName="circ1Tx" refType="w" fact="0.355"/>
+          <dgm:constr type="t" for="ch" forName="circ1Tx"/>
+          <dgm:constr type="w" for="ch" forName="circ1Tx" refType="w" fact="0.29"/>
+          <dgm:constr type="h" for="ch" forName="circ1Tx" refType="h" fact="0.235"/>
+          <dgm:constr type="ctrX" for="ch" forName="circ2" refType="w" fact="0.5951"/>
+          <dgm:constr type="ctrY" for="ch" forName="circ2" refType="h" fact="0.5567"/>
+          <dgm:constr type="w" for="ch" forName="circ2" refType="w" fact="0.25"/>
+          <dgm:constr type="h" for="ch" forName="circ2" refType="h" fact="0.35"/>
+          <dgm:constr type="l" for="ch" forName="circ2Tx" refType="w" fact="0.74"/>
+          <dgm:constr type="t" for="ch" forName="circ2Tx" refType="h" fact="0.31"/>
+          <dgm:constr type="w" for="ch" forName="circ2Tx" refType="w" fact="0.26"/>
+          <dgm:constr type="h" for="ch" forName="circ2Tx" refType="h" fact="0.255"/>
+          <dgm:constr type="ctrX" for="ch" forName="circ3" refType="w" fact="0.5588"/>
+          <dgm:constr type="ctrY" for="ch" forName="circ3" refType="h" fact="0.7133"/>
+          <dgm:constr type="w" for="ch" forName="circ3" refType="w" fact="0.25"/>
+          <dgm:constr type="h" for="ch" forName="circ3" refType="h" fact="0.35"/>
+          <dgm:constr type="l" for="ch" forName="circ3Tx" refType="w" fact="0.7"/>
+          <dgm:constr type="t" for="ch" forName="circ3Tx" refType="h" fact="0.745"/>
+          <dgm:constr type="w" for="ch" forName="circ3Tx" refType="w" fact="0.26"/>
+          <dgm:constr type="h" for="ch" forName="circ3Tx" refType="h" fact="0.255"/>
+          <dgm:constr type="ctrX" for="ch" forName="circ4" refType="w" fact="0.4412"/>
+          <dgm:constr type="ctrY" for="ch" forName="circ4" refType="h" fact="0.7133"/>
+          <dgm:constr type="w" for="ch" forName="circ4" refType="w" fact="0.25"/>
+          <dgm:constr type="h" for="ch" forName="circ4" refType="h" fact="0.35"/>
+          <dgm:constr type="l" for="ch" forName="circ4Tx" refType="w" fact="0.04"/>
+          <dgm:constr type="t" for="ch" forName="circ4Tx" refType="h" fact="0.745"/>
+          <dgm:constr type="w" for="ch" forName="circ4Tx" refType="w" fact="0.26"/>
+          <dgm:constr type="h" for="ch" forName="circ4Tx" refType="h" fact="0.255"/>
+          <dgm:constr type="ctrX" for="ch" forName="circ5" refType="w" fact="0.4049"/>
+          <dgm:constr type="ctrY" for="ch" forName="circ5" refType="h" fact="0.5567"/>
+          <dgm:constr type="w" for="ch" forName="circ5" refType="w" fact="0.25"/>
+          <dgm:constr type="h" for="ch" forName="circ5" refType="h" fact="0.35"/>
+          <dgm:constr type="l" for="ch" forName="circ5Tx"/>
+          <dgm:constr type="t" for="ch" forName="circ5Tx" refType="h" fact="0.31"/>
+          <dgm:constr type="w" for="ch" forName="circ5Tx" refType="w" fact="0.26"/>
+          <dgm:constr type="h" for="ch" forName="circ5Tx" refType="h" fact="0.255"/>
+          <dgm:constr type="primFontSz" for="ch" ptType="node" op="equ"/>
+        </dgm:constrLst>
+      </dgm:if>
+      <dgm:if name="Name15" axis="ch" ptType="node" func="cnt" op="equ" val="6">
+        <dgm:constrLst>
+          <dgm:constr type="ctrX" for="ch" forName="circ1" refType="w" fact="0.5"/>
+          <dgm:constr type="ctrY" for="ch" forName="circ1" refType="h" fact="0.3844"/>
+          <dgm:constr type="w" for="ch" forName="circ1" refType="w" fact="0.24"/>
+          <dgm:constr type="h" for="ch" forName="circ1" refType="h" fact="0.3084"/>
+          <dgm:constr type="l" for="ch" forName="circ1Tx" refType="w" fact="0.35"/>
+          <dgm:constr type="t" for="ch" forName="circ1Tx"/>
+          <dgm:constr type="w" for="ch" forName="circ1Tx" refType="w" fact="0.3"/>
+          <dgm:constr type="h" for="ch" forName="circ1Tx" refType="h" fact="0.21"/>
+          <dgm:constr type="ctrX" for="ch" forName="circ2" refType="w" fact="0.5779"/>
+          <dgm:constr type="ctrY" for="ch" forName="circ2" refType="h" fact="0.4422"/>
+          <dgm:constr type="w" for="ch" forName="circ2" refType="w" fact="0.24"/>
+          <dgm:constr type="h" for="ch" forName="circ2" refType="h" fact="0.3084"/>
+          <dgm:constr type="l" for="ch" forName="circ2Tx" refType="w" fact="0.7157"/>
+          <dgm:constr type="t" for="ch" forName="circ2Tx" refType="h" fact="0.2"/>
+          <dgm:constr type="w" for="ch" forName="circ2Tx" refType="w" fact="0.2843"/>
+          <dgm:constr type="h" for="ch" forName="circ2Tx" refType="h" fact="0.23"/>
+          <dgm:constr type="ctrX" for="ch" forName="circ3" refType="w" fact="0.5779"/>
+          <dgm:constr type="ctrY" for="ch" forName="circ3" refType="h" fact="0.5578"/>
+          <dgm:constr type="w" for="ch" forName="circ3" refType="w" fact="0.24"/>
+          <dgm:constr type="h" for="ch" forName="circ3" refType="h" fact="0.3084"/>
+          <dgm:constr type="l" for="ch" forName="circ3Tx" refType="w" fact="0.7157"/>
+          <dgm:constr type="t" for="ch" forName="circ3Tx" refType="h" fact="0.543"/>
+          <dgm:constr type="w" for="ch" forName="circ3Tx" refType="w" fact="0.2843"/>
+          <dgm:constr type="h" for="ch" forName="circ3Tx" refType="h" fact="0.257"/>
+          <dgm:constr type="ctrX" for="ch" forName="circ4" refType="w" fact="0.5"/>
+          <dgm:constr type="ctrY" for="ch" forName="circ4" refType="h" fact="0.6157"/>
+          <dgm:constr type="w" for="ch" forName="circ4" refType="w" fact="0.24"/>
+          <dgm:constr type="h" for="ch" forName="circ4" refType="h" fact="0.3084"/>
+          <dgm:constr type="l" for="ch" forName="circ4Tx" refType="w" fact="0.35"/>
+          <dgm:constr type="t" for="ch" forName="circ4Tx" refType="h" fact="0.79"/>
+          <dgm:constr type="w" for="ch" forName="circ4Tx" refType="w" fact="0.3"/>
+          <dgm:constr type="h" for="ch" forName="circ4Tx" refType="h" fact="0.21"/>
+          <dgm:constr type="ctrX" for="ch" forName="circ5" refType="w" fact="0.4221"/>
+          <dgm:constr type="ctrY" for="ch" forName="circ5" refType="h" fact="0.5578"/>
+          <dgm:constr type="w" for="ch" forName="circ5" refType="w" fact="0.24"/>
+          <dgm:constr type="h" for="ch" forName="circ5" refType="h" fact="0.3084"/>
+          <dgm:constr type="l" for="ch" forName="circ5Tx" refType="w" fact="0"/>
+          <dgm:constr type="t" for="ch" forName="circ5Tx" refType="h" fact="0.543"/>
+          <dgm:constr type="w" for="ch" forName="circ5Tx" refType="w" fact="0.2843"/>
+          <dgm:constr type="h" for="ch" forName="circ5Tx" refType="h" fact="0.257"/>
+          <dgm:constr type="ctrX" for="ch" forName="circ6" refType="w" fact="0.4221"/>
+          <dgm:constr type="ctrY" for="ch" forName="circ6" refType="h" fact="0.4422"/>
+          <dgm:constr type="w" for="ch" forName="circ6" refType="w" fact="0.24"/>
+          <dgm:constr type="h" for="ch" forName="circ6" refType="h" fact="0.3084"/>
+          <dgm:constr type="l" for="ch" forName="circ6Tx" refType="w" fact="0"/>
+          <dgm:constr type="t" for="ch" forName="circ6Tx" refType="h" fact="0.2"/>
+          <dgm:constr type="w" for="ch" forName="circ6Tx" refType="w" fact="0.2843"/>
+          <dgm:constr type="h" for="ch" forName="circ6Tx" refType="h" fact="0.257"/>
+          <dgm:constr type="primFontSz" for="ch" ptType="node" op="equ"/>
+        </dgm:constrLst>
+      </dgm:if>
+      <dgm:else name="Name16">
+        <dgm:constrLst>
+          <dgm:constr type="ctrX" for="ch" forName="circ1" refType="w" fact="0.5"/>
+          <dgm:constr type="ctrY" for="ch" forName="circ1" refType="h" fact="0.4177"/>
+          <dgm:constr type="w" for="ch" forName="circ1" refType="w" fact="0.24"/>
+          <dgm:constr type="h" for="ch" forName="circ1" refType="h" fact="0.3262"/>
+          <dgm:constr type="l" for="ch" forName="circ1Tx" refType="w" fact="0.3625"/>
+          <dgm:constr type="t" for="ch" forName="circ1Tx"/>
+          <dgm:constr type="w" for="ch" forName="circ1Tx" refType="w" fact="0.275"/>
+          <dgm:constr type="h" for="ch" forName="circ1Tx" refType="h" fact="0.2"/>
+          <dgm:constr type="ctrX" for="ch" forName="circ2" refType="w" fact="0.5704"/>
+          <dgm:constr type="ctrY" for="ch" forName="circ2" refType="h" fact="0.4637"/>
+          <dgm:constr type="w" for="ch" forName="circ2" refType="w" fact="0.24"/>
+          <dgm:constr type="h" for="ch" forName="circ2" refType="h" fact="0.3262"/>
+          <dgm:constr type="l" for="ch" forName="circ2Tx" refType="w" fact="0.72"/>
+          <dgm:constr type="t" for="ch" forName="circ2Tx" refType="h" fact="0.19"/>
+          <dgm:constr type="w" for="ch" forName="circ2Tx" refType="w" fact="0.26"/>
+          <dgm:constr type="h" for="ch" forName="circ2Tx" refType="h" fact="0.22"/>
+          <dgm:constr type="ctrX" for="ch" forName="circ3" refType="w" fact="0.5877"/>
+          <dgm:constr type="ctrY" for="ch" forName="circ3" refType="h" fact="0.5672"/>
+          <dgm:constr type="w" for="ch" forName="circ3" refType="w" fact="0.24"/>
+          <dgm:constr type="h" for="ch" forName="circ3" refType="h" fact="0.3262"/>
+          <dgm:constr type="l" for="ch" forName="circ3Tx" refType="w" fact="0.745"/>
+          <dgm:constr type="t" for="ch" forName="circ3Tx" refType="h" fact="0.47"/>
+          <dgm:constr type="w" for="ch" forName="circ3Tx" refType="w" fact="0.255"/>
+          <dgm:constr type="h" for="ch" forName="circ3Tx" refType="h" fact="0.235"/>
+          <dgm:constr type="ctrX" for="ch" forName="circ4" refType="w" fact="0.539"/>
+          <dgm:constr type="ctrY" for="ch" forName="circ4" refType="h" fact="0.6502"/>
+          <dgm:constr type="w" for="ch" forName="circ4" refType="w" fact="0.24"/>
+          <dgm:constr type="h" for="ch" forName="circ4" refType="h" fact="0.3262"/>
+          <dgm:constr type="l" for="ch" forName="circ4Tx" refType="w" fact="0.635"/>
+          <dgm:constr type="t" for="ch" forName="circ4Tx" refType="h" fact="0.785"/>
+          <dgm:constr type="w" for="ch" forName="circ4Tx" refType="w" fact="0.275"/>
+          <dgm:constr type="h" for="ch" forName="circ4Tx" refType="h" fact="0.215"/>
+          <dgm:constr type="ctrX" for="ch" forName="circ5" refType="w" fact="0.461"/>
+          <dgm:constr type="ctrY" for="ch" forName="circ5" refType="h" fact="0.6502"/>
+          <dgm:constr type="w" for="ch" forName="circ5" refType="w" fact="0.24"/>
+          <dgm:constr type="h" for="ch" forName="circ5" refType="h" fact="0.3262"/>
+          <dgm:constr type="l" for="ch" forName="circ5Tx" refType="w" fact="0.09"/>
+          <dgm:constr type="t" for="ch" forName="circ5Tx" refType="h" fact="0.785"/>
+          <dgm:constr type="w" for="ch" forName="circ5Tx" refType="w" fact="0.275"/>
+          <dgm:constr type="h" for="ch" forName="circ5Tx" refType="h" fact="0.215"/>
+          <dgm:constr type="ctrX" for="ch" forName="circ6" refType="w" fact="0.4123"/>
+          <dgm:constr type="ctrY" for="ch" forName="circ6" refType="h" fact="0.5672"/>
+          <dgm:constr type="w" for="ch" forName="circ6" refType="w" fact="0.24"/>
+          <dgm:constr type="h" for="ch" forName="circ6" refType="h" fact="0.3262"/>
+          <dgm:constr type="l" for="ch" forName="circ6Tx"/>
+          <dgm:constr type="t" for="ch" forName="circ6Tx" refType="h" fact="0.47"/>
+          <dgm:constr type="w" for="ch" forName="circ6Tx" refType="w" fact="0.255"/>
+          <dgm:constr type="h" for="ch" forName="circ6Tx" refType="h" fact="0.235"/>
+          <dgm:constr type="ctrX" for="ch" forName="circ7" refType="w" fact="0.4296"/>
+          <dgm:constr type="ctrY" for="ch" forName="circ7" refType="h" fact="0.4637"/>
+          <dgm:constr type="w" for="ch" forName="circ7" refType="w" fact="0.24"/>
+          <dgm:constr type="h" for="ch" forName="circ7" refType="h" fact="0.3262"/>
+          <dgm:constr type="l" for="ch" forName="circ7Tx" refType="w" fact="0.02"/>
+          <dgm:constr type="t" for="ch" forName="circ7Tx" refType="h" fact="0.19"/>
+          <dgm:constr type="w" for="ch" forName="circ7Tx" refType="w" fact="0.26"/>
+          <dgm:constr type="h" for="ch" forName="circ7Tx" refType="h" fact="0.22"/>
+          <dgm:constr type="primFontSz" for="ch" ptType="node" op="equ"/>
+        </dgm:constrLst>
+      </dgm:else>
+    </dgm:choose>
+    <dgm:ruleLst/>
+    <dgm:forEach name="Name17" axis="ch" ptType="node" cnt="1">
+      <dgm:choose name="Name18">
+        <dgm:if name="Name19" axis="root ch" ptType="all node" func="cnt" op="equ" val="1">
+          <dgm:layoutNode name="circ1TxSh" styleLbl="vennNode1">
+            <dgm:alg type="tx">
+              <dgm:param type="txAnchorHorzCh" val="ctr"/>
+              <dgm:param type="txAnchorVertCh" val="mid"/>
+            </dgm:alg>
+            <dgm:shape xmlns:r="http://schemas.openxmlformats.org/officeDocument/2006/relationships" type="ellipse" r:blip="">
+              <dgm:adjLst/>
+            </dgm:shape>
+            <dgm:choose name="Name20">
+              <dgm:if name="Name21" func="var" arg="dir" op="equ" val="norm">
+                <dgm:choose name="Name22">
+                  <dgm:if name="Name23" axis="root ch" ptType="all node" func="cnt" op="lte" val="4">
+                    <dgm:presOf axis="desOrSelf" ptType="node"/>
+                  </dgm:if>
+                  <dgm:else name="Name24">
+                    <dgm:presOf/>
+                  </dgm:else>
+                </dgm:choose>
+              </dgm:if>
+              <dgm:else name="Name25">
+                <dgm:choose name="Name26">
+                  <dgm:if name="Name27" axis="root ch" ptType="all node" func="cnt" op="equ" val="2">
+                    <dgm:presOf axis="root ch desOrSelf" ptType="all node node" st="1 2 1" cnt="1 1 0"/>
+                  </dgm:if>
+                  <dgm:else name="Name28">
+                    <dgm:presOf axis="desOrSelf" ptType="node"/>
+                  </dgm:else>
+                </dgm:choose>
+              </dgm:else>
+            </dgm:choose>
+            <dgm:constrLst>
+              <dgm:constr type="tMarg"/>
+              <dgm:constr type="bMarg"/>
+              <dgm:constr type="lMarg"/>
+              <dgm:constr type="rMarg"/>
+              <dgm:constr type="primFontSz" val="65"/>
+            </dgm:constrLst>
+            <dgm:ruleLst>
+              <dgm:rule type="primFontSz" val="5" fact="NaN" max="NaN"/>
+            </dgm:ruleLst>
+          </dgm:layoutNode>
+        </dgm:if>
+        <dgm:else name="Name29">
+          <dgm:layoutNode name="circ1" styleLbl="vennNode1">
+            <dgm:alg type="sp"/>
+            <dgm:shape xmlns:r="http://schemas.openxmlformats.org/officeDocument/2006/relationships" type="ellipse" r:blip="">
+              <dgm:adjLst/>
+            </dgm:shape>
+            <dgm:choose name="Name30">
+              <dgm:if name="Name31" func="var" arg="dir" op="equ" val="norm">
+                <dgm:choose name="Name32">
+                  <dgm:if name="Name33" axis="root ch" ptType="all node" func="cnt" op="lte" val="4">
+                    <dgm:presOf axis="desOrSelf" ptType="node"/>
+                  </dgm:if>
+                  <dgm:else name="Name34">
+                    <dgm:presOf/>
+                  </dgm:else>
+                </dgm:choose>
+              </dgm:if>
+              <dgm:else name="Name35">
+                <dgm:choose name="Name36">
+                  <dgm:if name="Name37" axis="root ch" ptType="all node" func="cnt" op="equ" val="2">
+                    <dgm:presOf axis="root ch desOrSelf" ptType="all node node" st="1 2 1" cnt="1 1 0"/>
+                  </dgm:if>
+                  <dgm:else name="Name38">
+                    <dgm:choose name="Name39">
+                      <dgm:if name="Name40" axis="root ch" ptType="all node" func="cnt" op="lte" val="4">
+                        <dgm:presOf axis="desOrSelf" ptType="node"/>
+                      </dgm:if>
+                      <dgm:else name="Name41">
+                        <dgm:presOf/>
+                      </dgm:else>
+                    </dgm:choose>
+                  </dgm:else>
+                </dgm:choose>
+              </dgm:else>
+            </dgm:choose>
+            <dgm:constrLst/>
+            <dgm:ruleLst/>
+          </dgm:layoutNode>
+          <dgm:layoutNode name="circ1Tx" styleLbl="revTx">
+            <dgm:varLst>
+              <dgm:chMax val="0"/>
+              <dgm:chPref val="0"/>
+              <dgm:bulletEnabled val="1"/>
+            </dgm:varLst>
+            <dgm:alg type="tx">
+              <dgm:param type="txAnchorHorzCh" val="ctr"/>
+              <dgm:param type="txAnchorVertCh" val="mid"/>
+            </dgm:alg>
+            <dgm:shape xmlns:r="http://schemas.openxmlformats.org/officeDocument/2006/relationships" type="rect" r:blip="" hideGeom="1">
+              <dgm:adjLst/>
+            </dgm:shape>
+            <dgm:choose name="Name42">
+              <dgm:if name="Name43" func="var" arg="dir" op="equ" val="norm">
+                <dgm:presOf axis="desOrSelf" ptType="node"/>
+              </dgm:if>
+              <dgm:else name="Name44">
+                <dgm:choose name="Name45">
+                  <dgm:if name="Name46" axis="root ch" ptType="all node" func="cnt" op="equ" val="2">
+                    <dgm:presOf axis="root ch desOrSelf" ptType="all node node" st="1 2 1" cnt="1 1 0"/>
+                  </dgm:if>
+                  <dgm:else name="Name47">
+                    <dgm:presOf axis="desOrSelf" ptType="node"/>
+                  </dgm:else>
+                </dgm:choose>
+              </dgm:else>
+            </dgm:choose>
+            <dgm:constrLst>
+              <dgm:constr type="tMarg"/>
+              <dgm:constr type="bMarg"/>
+              <dgm:constr type="lMarg"/>
+              <dgm:constr type="rMarg"/>
+              <dgm:constr type="primFontSz" val="65"/>
+            </dgm:constrLst>
+            <dgm:ruleLst>
+              <dgm:rule type="primFontSz" val="5" fact="NaN" max="NaN"/>
+            </dgm:ruleLst>
+          </dgm:layoutNode>
+        </dgm:else>
+      </dgm:choose>
+    </dgm:forEach>
+    <dgm:forEach name="Name48" axis="ch" ptType="node" st="2" cnt="1">
+      <dgm:layoutNode name="circ2" styleLbl="vennNode1">
+        <dgm:alg type="sp"/>
+        <dgm:shape xmlns:r="http://schemas.openxmlformats.org/officeDocument/2006/relationships" type="ellipse" r:blip="">
+          <dgm:adjLst/>
+        </dgm:shape>
+        <dgm:choose name="Name49">
+          <dgm:if name="Name50" func="var" arg="dir" op="equ" val="norm">
+            <dgm:choose name="Name51">
+              <dgm:if name="Name52" axis="root ch" ptType="all node" func="cnt" op="lte" val="4">
+                <dgm:presOf axis="desOrSelf" ptType="node"/>
+              </dgm:if>
+              <dgm:else name="Name53">
+                <dgm:presOf/>
+              </dgm:else>
+            </dgm:choose>
+          </dgm:if>
+          <dgm:else name="Name54">
+            <dgm:choose name="Name55">
+              <dgm:if name="Name56" axis="root ch" ptType="all node" func="cnt" op="equ" val="2">
+                <dgm:presOf axis="root ch desOrSelf" ptType="all node node" st="1 1 1" cnt="1 1 0"/>
+              </dgm:if>
+              <dgm:if name="Name57" axis="root ch" ptType="all node" func="cnt" op="equ" val="3">
+                <dgm:presOf axis="root ch desOrSelf" ptType="all node node" st="1 3 1" cnt="1 1 0"/>
+              </dgm:if>
+              <dgm:if name="Name58" axis="root ch" ptType="all node" func="cnt" op="equ" val="4">
+                <dgm:presOf axis="root ch desOrSelf" ptType="all node node" st="1 4 1" cnt="1 1 0"/>
+              </dgm:if>
+              <dgm:else name="Name59">
+                <dgm:presOf/>
+              </dgm:else>
+            </dgm:choose>
+          </dgm:else>
+        </dgm:choose>
+        <dgm:constrLst/>
+        <dgm:ruleLst/>
+      </dgm:layoutNode>
+      <dgm:layoutNode name="circ2Tx" styleLbl="revTx">
+        <dgm:varLst>
+          <dgm:chMax val="0"/>
+          <dgm:chPref val="0"/>
+          <dgm:bulletEnabled val="1"/>
+        </dgm:varLst>
+        <dgm:alg type="tx">
+          <dgm:param type="txAnchorHorzCh" val="ctr"/>
+          <dgm:param type="txAnchorVertCh" val="mid"/>
+        </dgm:alg>
+        <dgm:shape xmlns:r="http://schemas.openxmlformats.org/officeDocument/2006/relationships" type="rect" r:blip="" hideGeom="1">
+          <dgm:adjLst/>
+        </dgm:shape>
+        <dgm:choose name="Name60">
+          <dgm:if name="Name61" func="var" arg="dir" op="equ" val="norm">
+            <dgm:presOf axis="desOrSelf" ptType="node"/>
+          </dgm:if>
+          <dgm:else name="Name62">
+            <dgm:choose name="Name63">
+              <dgm:if name="Name64" axis="root ch" ptType="all node" func="cnt" op="equ" val="2">
+                <dgm:presOf axis="root ch desOrSelf" ptType="all node node" st="1 1 1" cnt="1 1 0"/>
+              </dgm:if>
+              <dgm:if name="Name65" axis="root ch" ptType="all node" func="cnt" op="equ" val="3">
+                <dgm:presOf axis="root ch desOrSelf" ptType="all node node" st="1 3 1" cnt="1 1 0"/>
+              </dgm:if>
+              <dgm:if name="Name66" axis="root ch" ptType="all node" func="cnt" op="equ" val="4">
+                <dgm:presOf axis="root ch desOrSelf" ptType="all node node" st="1 4 1" cnt="1 1 0"/>
+              </dgm:if>
+              <dgm:if name="Name67" axis="root ch" ptType="all node" func="cnt" op="equ" val="5">
+                <dgm:presOf axis="root ch desOrSelf" ptType="all node node" st="1 5 1" cnt="1 1 0"/>
+              </dgm:if>
+              <dgm:if name="Name68" axis="root ch" ptType="all node" func="cnt" op="equ" val="6">
+                <dgm:presOf axis="root ch desOrSelf" ptType="all node node" st="1 6 1" cnt="1 1 0"/>
+              </dgm:if>
+              <dgm:else name="Name69">
+                <dgm:presOf axis="root ch desOrSelf" ptType="all node node" st="1 7 1" cnt="1 1 0"/>
+              </dgm:else>
+            </dgm:choose>
+          </dgm:else>
+        </dgm:choose>
+        <dgm:constrLst>
+          <dgm:constr type="tMarg"/>
+          <dgm:constr type="bMarg"/>
+          <dgm:constr type="lMarg"/>
+          <dgm:constr type="rMarg"/>
+          <dgm:constr type="primFontSz" val="65"/>
+        </dgm:constrLst>
+        <dgm:ruleLst>
+          <dgm:rule type="primFontSz" val="5" fact="NaN" max="NaN"/>
+        </dgm:ruleLst>
+      </dgm:layoutNode>
+    </dgm:forEach>
+    <dgm:forEach name="Name70" axis="ch" ptType="node" st="3" cnt="1">
+      <dgm:layoutNode name="circ3" styleLbl="vennNode1">
+        <dgm:alg type="sp"/>
+        <dgm:shape xmlns:r="http://schemas.openxmlformats.org/officeDocument/2006/relationships" type="ellipse" r:blip="">
+          <dgm:adjLst/>
+        </dgm:shape>
+        <dgm:choose name="Name71">
+          <dgm:if name="Name72" func="var" arg="dir" op="equ" val="norm">
+            <dgm:choose name="Name73">
+              <dgm:if name="Name74" axis="root ch" ptType="all node" func="cnt" op="lte" val="4">
+                <dgm:presOf axis="desOrSelf" ptType="node"/>
+              </dgm:if>
+              <dgm:else name="Name75">
+                <dgm:presOf/>
+              </dgm:else>
+            </dgm:choose>
+          </dgm:if>
+          <dgm:else name="Name76">
+            <dgm:choose name="Name77">
+              <dgm:if name="Name78" axis="root ch" ptType="all node" func="cnt" op="equ" val="3">
+                <dgm:presOf axis="root ch desOrSelf" ptType="all node node" st="1 2 1" cnt="1 1 0"/>
+              </dgm:if>
+              <dgm:if name="Name79" axis="root ch" ptType="all node" func="cnt" op="equ" val="4">
+                <dgm:presOf axis="root ch desOrSelf" ptType="all node node" st="1 3 1" cnt="1 1 0"/>
+              </dgm:if>
+              <dgm:else name="Name80">
+                <dgm:presOf/>
+              </dgm:else>
+            </dgm:choose>
+          </dgm:else>
+        </dgm:choose>
+        <dgm:constrLst/>
+        <dgm:ruleLst/>
+      </dgm:layoutNode>
+      <dgm:layoutNode name="circ3Tx" styleLbl="revTx">
+        <dgm:varLst>
+          <dgm:chMax val="0"/>
+          <dgm:chPref val="0"/>
+          <dgm:bulletEnabled val="1"/>
+        </dgm:varLst>
+        <dgm:alg type="tx">
+          <dgm:param type="txAnchorHorzCh" val="ctr"/>
+          <dgm:param type="txAnchorVertCh" val="mid"/>
+        </dgm:alg>
+        <dgm:shape xmlns:r="http://schemas.openxmlformats.org/officeDocument/2006/relationships" type="rect" r:blip="" hideGeom="1">
+          <dgm:adjLst/>
+        </dgm:shape>
+        <dgm:choose name="Name81">
+          <dgm:if name="Name82" func="var" arg="dir" op="equ" val="norm">
+            <dgm:presOf axis="desOrSelf" ptType="node"/>
+          </dgm:if>
+          <dgm:else name="Name83">
+            <dgm:choose name="Name84">
+              <dgm:if name="Name85" axis="root ch" ptType="all node" func="cnt" op="equ" val="3">
+                <dgm:presOf axis="root ch desOrSelf" ptType="all node node" st="1 2 1" cnt="1 1 0"/>
+              </dgm:if>
+              <dgm:if name="Name86" axis="root ch" ptType="all node" func="cnt" op="equ" val="4">
+                <dgm:presOf axis="root ch desOrSelf" ptType="all node node" st="1 3 1" cnt="1 1 0"/>
+              </dgm:if>
+              <dgm:if name="Name87" axis="root ch" ptType="all node" func="cnt" op="equ" val="5">
+                <dgm:presOf axis="root ch desOrSelf" ptType="all node node" st="1 4 1" cnt="1 1 0"/>
+              </dgm:if>
+              <dgm:if name="Name88" axis="root ch" ptType="all node" func="cnt" op="equ" val="6">
+                <dgm:presOf axis="root ch desOrSelf" ptType="all node node" st="1 5 1" cnt="1 1 0"/>
+              </dgm:if>
+              <dgm:else name="Name89">
+                <dgm:presOf axis="root ch desOrSelf" ptType="all node node" st="1 6 1" cnt="1 1 0"/>
+              </dgm:else>
+            </dgm:choose>
+          </dgm:else>
+        </dgm:choose>
+        <dgm:constrLst>
+          <dgm:constr type="tMarg"/>
+          <dgm:constr type="bMarg"/>
+          <dgm:constr type="lMarg"/>
+          <dgm:constr type="rMarg"/>
+          <dgm:constr type="primFontSz" val="65"/>
+        </dgm:constrLst>
+        <dgm:ruleLst>
+          <dgm:rule type="primFontSz" val="5" fact="NaN" max="NaN"/>
+        </dgm:ruleLst>
+      </dgm:layoutNode>
+    </dgm:forEach>
+    <dgm:forEach name="Name90" axis="ch" ptType="node" st="4" cnt="1">
+      <dgm:layoutNode name="circ4" styleLbl="vennNode1">
+        <dgm:alg type="sp"/>
+        <dgm:shape xmlns:r="http://schemas.openxmlformats.org/officeDocument/2006/relationships" type="ellipse" r:blip="">
+          <dgm:adjLst/>
+        </dgm:shape>
+        <dgm:choose name="Name91">
+          <dgm:if name="Name92" func="var" arg="dir" op="equ" val="norm">
+            <dgm:choose name="Name93">
+              <dgm:if name="Name94" axis="root ch" ptType="all node" func="cnt" op="lte" val="4">
+                <dgm:presOf axis="desOrSelf" ptType="node"/>
+              </dgm:if>
+              <dgm:else name="Name95">
+                <dgm:presOf/>
+              </dgm:else>
+            </dgm:choose>
+          </dgm:if>
+          <dgm:else name="Name96">
+            <dgm:choose name="Name97">
+              <dgm:if name="Name98" axis="root ch" ptType="all node" func="cnt" op="equ" val="4">
+                <dgm:presOf axis="root ch desOrSelf" ptType="all node node" st="1 2 1" cnt="1 1 0"/>
+              </dgm:if>
+              <dgm:else name="Name99">
+                <dgm:presOf/>
+              </dgm:else>
+            </dgm:choose>
+          </dgm:else>
+        </dgm:choose>
+        <dgm:constrLst/>
+        <dgm:ruleLst/>
+      </dgm:layoutNode>
+      <dgm:layoutNode name="circ4Tx" styleLbl="revTx">
+        <dgm:varLst>
+          <dgm:chMax val="0"/>
+          <dgm:chPref val="0"/>
+          <dgm:bulletEnabled val="1"/>
+        </dgm:varLst>
+        <dgm:alg type="tx">
+          <dgm:param type="txAnchorHorzCh" val="ctr"/>
+          <dgm:param type="txAnchorVertCh" val="mid"/>
+        </dgm:alg>
+        <dgm:shape xmlns:r="http://schemas.openxmlformats.org/officeDocument/2006/relationships" type="rect" r:blip="" hideGeom="1">
+          <dgm:adjLst/>
+        </dgm:shape>
+        <dgm:choose name="Name100">
+          <dgm:if name="Name101" func="var" arg="dir" op="equ" val="norm">
+            <dgm:presOf axis="desOrSelf" ptType="node"/>
+          </dgm:if>
+          <dgm:else name="Name102">
+            <dgm:choose name="Name103">
+              <dgm:if name="Name104" axis="root ch" ptType="all node" func="cnt" op="equ" val="4">
+                <dgm:presOf axis="root ch desOrSelf" ptType="all node node" st="1 2 1" cnt="1 1 0"/>
+              </dgm:if>
+              <dgm:if name="Name105" axis="root ch" ptType="all node" func="cnt" op="equ" val="5">
+                <dgm:presOf axis="root ch desOrSelf" ptType="all node node" st="1 3 1" cnt="1 1 0"/>
+              </dgm:if>
+              <dgm:if name="Name106" axis="root ch" ptType="all node" func="cnt" op="equ" val="6">
+                <dgm:presOf axis="root ch desOrSelf" ptType="all node node" st="1 4 1" cnt="1 1 0"/>
+              </dgm:if>
+              <dgm:else name="Name107">
+                <dgm:presOf axis="root ch desOrSelf" ptType="all node node" st="1 5 1" cnt="1 1 0"/>
+              </dgm:else>
+            </dgm:choose>
+          </dgm:else>
+        </dgm:choose>
+        <dgm:constrLst>
+          <dgm:constr type="tMarg"/>
+          <dgm:constr type="bMarg"/>
+          <dgm:constr type="lMarg"/>
+          <dgm:constr type="rMarg"/>
+          <dgm:constr type="primFontSz" val="65"/>
+        </dgm:constrLst>
+        <dgm:ruleLst>
+          <dgm:rule type="primFontSz" val="5" fact="NaN" max="NaN"/>
+        </dgm:ruleLst>
+      </dgm:layoutNode>
+    </dgm:forEach>
+    <dgm:forEach name="Name108" axis="ch" ptType="node" st="5" cnt="1">
+      <dgm:layoutNode name="circ5" styleLbl="vennNode1">
+        <dgm:alg type="sp"/>
+        <dgm:shape xmlns:r="http://schemas.openxmlformats.org/officeDocument/2006/relationships" type="ellipse" r:blip="">
+          <dgm:adjLst/>
+        </dgm:shape>
+        <dgm:presOf/>
+        <dgm:constrLst/>
+        <dgm:ruleLst/>
+      </dgm:layoutNode>
+      <dgm:layoutNode name="circ5Tx" styleLbl="revTx">
+        <dgm:varLst>
+          <dgm:chMax val="0"/>
+          <dgm:chPref val="0"/>
+          <dgm:bulletEnabled val="1"/>
+        </dgm:varLst>
+        <dgm:alg type="tx">
+          <dgm:param type="txAnchorHorzCh" val="ctr"/>
+          <dgm:param type="txAnchorVertCh" val="mid"/>
+        </dgm:alg>
+        <dgm:shape xmlns:r="http://schemas.openxmlformats.org/officeDocument/2006/relationships" type="rect" r:blip="" hideGeom="1">
+          <dgm:adjLst/>
+        </dgm:shape>
+        <dgm:choose name="Name109">
+          <dgm:if name="Name110" func="var" arg="dir" op="equ" val="norm">
+            <dgm:presOf axis="desOrSelf" ptType="node"/>
+          </dgm:if>
+          <dgm:else name="Name111">
+            <dgm:choose name="Name112">
+              <dgm:if name="Name113" axis="root ch" ptType="all node" func="cnt" op="equ" val="5">
+                <dgm:presOf axis="root ch desOrSelf" ptType="all node node" st="1 2 1" cnt="1 1 0"/>
+              </dgm:if>
+              <dgm:if name="Name114" axis="root ch" ptType="all node" func="cnt" op="equ" val="6">
+                <dgm:presOf axis="root ch desOrSelf" ptType="all node node" st="1 3 1" cnt="1 1 0"/>
+              </dgm:if>
+              <dgm:else name="Name115">
+                <dgm:presOf axis="root ch desOrSelf" ptType="all node node" st="1 4 1" cnt="1 1 0"/>
+              </dgm:else>
+            </dgm:choose>
+          </dgm:else>
+        </dgm:choose>
+        <dgm:constrLst>
+          <dgm:constr type="tMarg"/>
+          <dgm:constr type="bMarg"/>
+          <dgm:constr type="lMarg"/>
+          <dgm:constr type="rMarg"/>
+          <dgm:constr type="primFontSz" val="65"/>
+        </dgm:constrLst>
+        <dgm:ruleLst>
+          <dgm:rule type="primFontSz" val="5" fact="NaN" max="NaN"/>
+        </dgm:ruleLst>
+      </dgm:layoutNode>
+    </dgm:forEach>
+    <dgm:forEach name="Name116" axis="ch" ptType="node" st="6" cnt="1">
+      <dgm:layoutNode name="circ6" styleLbl="vennNode1">
+        <dgm:alg type="sp"/>
+        <dgm:shape xmlns:r="http://schemas.openxmlformats.org/officeDocument/2006/relationships" type="ellipse" r:blip="">
+          <dgm:adjLst/>
+        </dgm:shape>
+        <dgm:presOf/>
+        <dgm:constrLst/>
+        <dgm:ruleLst/>
+      </dgm:layoutNode>
+      <dgm:layoutNode name="circ6Tx" styleLbl="revTx">
+        <dgm:varLst>
+          <dgm:chMax val="0"/>
+          <dgm:chPref val="0"/>
+          <dgm:bulletEnabled val="1"/>
+        </dgm:varLst>
+        <dgm:alg type="tx">
+          <dgm:param type="txAnchorHorzCh" val="ctr"/>
+          <dgm:param type="txAnchorVertCh" val="mid"/>
+        </dgm:alg>
+        <dgm:shape xmlns:r="http://schemas.openxmlformats.org/officeDocument/2006/relationships" type="rect" r:blip="" hideGeom="1">
+          <dgm:adjLst/>
+        </dgm:shape>
+        <dgm:choose name="Name117">
+          <dgm:if name="Name118" func="var" arg="dir" op="equ" val="norm">
+            <dgm:presOf axis="desOrSelf" ptType="node"/>
+          </dgm:if>
+          <dgm:else name="Name119">
+            <dgm:choose name="Name120">
+              <dgm:if name="Name121" axis="root ch" ptType="all node" func="cnt" op="equ" val="6">
+                <dgm:presOf axis="root ch desOrSelf" ptType="all node node" st="1 2 1" cnt="1 1 0"/>
+              </dgm:if>
+              <dgm:else name="Name122">
+                <dgm:presOf axis="root ch desOrSelf" ptType="all node node" st="1 3 1" cnt="1 1 0"/>
+              </dgm:else>
+            </dgm:choose>
+          </dgm:else>
+        </dgm:choose>
+        <dgm:constrLst>
+          <dgm:constr type="tMarg"/>
+          <dgm:constr type="bMarg"/>
+          <dgm:constr type="lMarg"/>
+          <dgm:constr type="rMarg"/>
+          <dgm:constr type="primFontSz" val="65"/>
+        </dgm:constrLst>
+        <dgm:ruleLst>
+          <dgm:rule type="primFontSz" val="5" fact="NaN" max="NaN"/>
+        </dgm:ruleLst>
+      </dgm:layoutNode>
+    </dgm:forEach>
+    <dgm:forEach name="Name123" axis="ch" ptType="node" st="7" cnt="1">
+      <dgm:layoutNode name="circ7" styleLbl="vennNode1">
+        <dgm:alg type="sp"/>
+        <dgm:shape xmlns:r="http://schemas.openxmlformats.org/officeDocument/2006/relationships" type="ellipse" r:blip="">
+          <dgm:adjLst/>
+        </dgm:shape>
+        <dgm:presOf/>
+        <dgm:constrLst/>
+        <dgm:ruleLst/>
+      </dgm:layoutNode>
+      <dgm:layoutNode name="circ7Tx" styleLbl="revTx">
+        <dgm:varLst>
+          <dgm:chMax val="0"/>
+          <dgm:chPref val="0"/>
+          <dgm:bulletEnabled val="1"/>
+        </dgm:varLst>
+        <dgm:alg type="tx">
+          <dgm:param type="txAnchorHorzCh" val="ctr"/>
+          <dgm:param type="txAnchorVertCh" val="mid"/>
+        </dgm:alg>
+        <dgm:shape xmlns:r="http://schemas.openxmlformats.org/officeDocument/2006/relationships" type="rect" r:blip="" hideGeom="1">
+          <dgm:adjLst/>
+        </dgm:shape>
+        <dgm:choose name="Name124">
+          <dgm:if name="Name125" func="var" arg="dir" op="equ" val="norm">
+            <dgm:presOf axis="desOrSelf" ptType="node"/>
+          </dgm:if>
+          <dgm:else name="Name126">
+            <dgm:presOf axis="root ch desOrSelf" ptType="all node node" st="1 2 1" cnt="1 1 0"/>
+          </dgm:else>
+        </dgm:choose>
+        <dgm:constrLst>
+          <dgm:constr type="tMarg"/>
+          <dgm:constr type="bMarg"/>
+          <dgm:constr type="lMarg"/>
+          <dgm:constr type="rMarg"/>
+          <dgm:constr type="primFontSz" val="65"/>
+        </dgm:constrLst>
+        <dgm:ruleLst>
+          <dgm:rule type="primFontSz" val="5" fact="NaN" max="NaN"/>
+        </dgm:ruleLst>
+      </dgm:layoutNode>
+    </dgm:forEach>
+  </dgm:layoutNode>
+</dgm:layoutDef>
+</file>
+
+<file path=ppt/diagrams/quickStyle1.xml><?xml version="1.0" encoding="utf-8"?>
+<dgm:styleDef xmlns:dgm="http://schemas.openxmlformats.org/drawingml/2006/diagram" xmlns:a="http://schemas.openxmlformats.org/drawingml/2006/main" uniqueId="urn:microsoft.com/office/officeart/2005/8/quickstyle/simple1">
+  <dgm:title val=""/>
+  <dgm:desc val=""/>
+  <dgm:catLst>
+    <dgm:cat type="simple" pri="10100"/>
+  </dgm:catLst>
+  <dgm:scene3d>
+    <a:camera prst="orthographicFront"/>
+    <a:lightRig rig="threePt" dir="t"/>
+  </dgm:scene3d>
+  <dgm:styleLbl name="node0">
+    <dgm:scene3d>
+      <a:camera prst="orthographicFront"/>
+      <a:lightRig rig="threePt" dir="t"/>
+    </dgm:scene3d>
+    <dgm:sp3d/>
+    <dgm:txPr/>
+    <dgm:style>
+      <a:lnRef idx="2">
+        <a:scrgbClr r="0" g="0" b="0"/>
+      </a:lnRef>
+      <a:fillRef idx="1">
+        <a:scrgbClr r="0" g="0" b="0"/>
+      </a:fillRef>
+      <a:effectRef idx="0">
+        <a:scrgbClr r="0" g="0" b="0"/>
+      </a:effectRef>
+      <a:fontRef idx="minor">
+        <a:schemeClr val="lt1"/>
+      </a:fontRef>
+    </dgm:style>
+  </dgm:styleLbl>
+  <dgm:styleLbl name="lnNode1">
+    <dgm:scene3d>
+      <a:camera prst="orthographicFront"/>
+      <a:lightRig rig="threePt" dir="t"/>
+    </dgm:scene3d>
+    <dgm:sp3d/>
+    <dgm:txPr/>
+    <dgm:style>
+      <a:lnRef idx="2">
+        <a:scrgbClr r="0" g="0" b="0"/>
+      </a:lnRef>
+      <a:fillRef idx="1">
+        <a:scrgbClr r="0" g="0" b="0"/>
+      </a:fillRef>
+      <a:effectRef idx="0">
+        <a:scrgbClr r="0" g="0" b="0"/>
+      </a:effectRef>
+      <a:fontRef idx="minor">
+        <a:schemeClr val="lt1"/>
+      </a:fontRef>
+    </dgm:style>
+  </dgm:styleLbl>
+  <dgm:styleLbl name="vennNode1">
+    <dgm:scene3d>
+      <a:camera prst="orthographicFront"/>
+      <a:lightRig rig="threePt" dir="t"/>
+    </dgm:scene3d>
+    <dgm:sp3d/>
+    <dgm:txPr/>
+    <dgm:style>
+      <a:lnRef idx="2">
+        <a:scrgbClr r="0" g="0" b="0"/>
+      </a:lnRef>
+      <a:fillRef idx="1">
+        <a:scrgbClr r="0" g="0" b="0"/>
+      </a:fillRef>
+      <a:effectRef idx="0">
+        <a:scrgbClr r="0" g="0" b="0"/>
+      </a:effectRef>
+      <a:fontRef idx="minor">
+        <a:schemeClr val="tx1"/>
+      </a:fontRef>
+    </dgm:style>
+  </dgm:styleLbl>
+  <dgm:styleLbl name="alignNode1">
+    <dgm:scene3d>
+      <a:camera prst="orthographicFront"/>
+      <a:lightRig rig="threePt" dir="t"/>
+    </dgm:scene3d>
+    <dgm:sp3d/>
+    <dgm:txPr/>
+    <dgm:style>
+      <a:lnRef idx="2">
+        <a:scrgbClr r="0" g="0" b="0"/>
+      </a:lnRef>
+      <a:fillRef idx="1">
+        <a:scrgbClr r="0" g="0" b="0"/>
+      </a:fillRef>
+      <a:effectRef idx="0">
+        <a:scrgbClr r="0" g="0" b="0"/>
+      </a:effectRef>
+      <a:fontRef idx="minor">
+        <a:schemeClr val="lt1"/>
+      </a:fontRef>
+    </dgm:style>
+  </dgm:styleLbl>
+  <dgm:styleLbl name="node1">
+    <dgm:scene3d>
+      <a:camera prst="orthographicFront"/>
+      <a:lightRig rig="threePt" dir="t"/>
+    </dgm:scene3d>
+    <dgm:sp3d/>
+    <dgm:txPr/>
+    <dgm:style>
+      <a:lnRef idx="2">
+        <a:scrgbClr r="0" g="0" b="0"/>
+      </a:lnRef>
+      <a:fillRef idx="1">
+        <a:scrgbClr r="0" g="0" b="0"/>
+      </a:fillRef>
+      <a:effectRef idx="0">
+        <a:scrgbClr r="0" g="0" b="0"/>
+      </a:effectRef>
+      <a:fontRef idx="minor">
+        <a:schemeClr val="lt1"/>
+      </a:fontRef>
+    </dgm:style>
+  </dgm:styleLbl>
+  <dgm:styleLbl name="node2">
+    <dgm:scene3d>
+      <a:camera prst="orthographicFront"/>
+      <a:lightRig rig="threePt" dir="t"/>
+    </dgm:scene3d>
+    <dgm:sp3d/>
+    <dgm:txPr/>
+    <dgm:style>
+      <a:lnRef idx="2">
+        <a:scrgbClr r="0" g="0" b="0"/>
+      </a:lnRef>
+      <a:fillRef idx="1">
+        <a:scrgbClr r="0" g="0" b="0"/>
+      </a:fillRef>
+      <a:effectRef idx="0">
+        <a:scrgbClr r="0" g="0" b="0"/>
+      </a:effectRef>
+      <a:fontRef idx="minor">
+        <a:schemeClr val="lt1"/>
+      </a:fontRef>
+    </dgm:style>
+  </dgm:styleLbl>
+  <dgm:styleLbl name="node3">
+    <dgm:scene3d>
+      <a:camera prst="orthographicFront"/>
+      <a:lightRig rig="threePt" dir="t"/>
+    </dgm:scene3d>
+    <dgm:sp3d/>
+    <dgm:txPr/>
+    <dgm:style>
+      <a:lnRef idx="2">
+        <a:scrgbClr r="0" g="0" b="0"/>
+      </a:lnRef>
+      <a:fillRef idx="1">
+        <a:scrgbClr r="0" g="0" b="0"/>
+      </a:fillRef>
+      <a:effectRef idx="0">
+        <a:scrgbClr r="0" g="0" b="0"/>
+      </a:effectRef>
+      <a:fontRef idx="minor">
+        <a:schemeClr val="lt1"/>
+      </a:fontRef>
+    </dgm:style>
+  </dgm:styleLbl>
+  <dgm:styleLbl name="node4">
+    <dgm:scene3d>
+      <a:camera prst="orthographicFront"/>
+      <a:lightRig rig="threePt" dir="t"/>
+    </dgm:scene3d>
+    <dgm:sp3d/>
+    <dgm:txPr/>
+    <dgm:style>
+      <a:lnRef idx="2">
+        <a:scrgbClr r="0" g="0" b="0"/>
+      </a:lnRef>
+      <a:fillRef idx="1">
+        <a:scrgbClr r="0" g="0" b="0"/>
+      </a:fillRef>
+      <a:effectRef idx="0">
+        <a:scrgbClr r="0" g="0" b="0"/>
+      </a:effectRef>
+      <a:fontRef idx="minor">
+        <a:schemeClr val="lt1"/>
+      </a:fontRef>
+    </dgm:style>
+  </dgm:styleLbl>
+  <dgm:styleLbl name="fgImgPlace1">
+    <dgm:scene3d>
+      <a:camera prst="orthographicFront"/>
+      <a:lightRig rig="threePt" dir="t"/>
+    </dgm:scene3d>
+    <dgm:sp3d/>
+    <dgm:txPr/>
+    <dgm:style>
+      <a:lnRef idx="2">
+        <a:scrgbClr r="0" g="0" b="0"/>
+      </a:lnRef>
+      <a:fillRef idx="1">
+        <a:scrgbClr r="0" g="0" b="0"/>
+      </a:fillRef>
+      <a:effectRef idx="0">
+        <a:scrgbClr r="0" g="0" b="0"/>
+      </a:effectRef>
+      <a:fontRef idx="minor"/>
+    </dgm:style>
+  </dgm:styleLbl>
+  <dgm:styleLbl name="alignImgPlace1">
+    <dgm:scene3d>
+      <a:camera prst="orthographicFront"/>
+      <a:lightRig rig="threePt" dir="t"/>
+    </dgm:scene3d>
+    <dgm:sp3d/>
+    <dgm:txPr/>
+    <dgm:style>
+      <a:lnRef idx="2">
+        <a:scrgbClr r="0" g="0" b="0"/>
+      </a:lnRef>
+      <a:fillRef idx="1">
+        <a:scrgbClr r="0" g="0" b="0"/>
+      </a:fillRef>
+      <a:effectRef idx="0">
+        <a:scrgbClr r="0" g="0" b="0"/>
+      </a:effectRef>
+      <a:fontRef idx="minor"/>
+    </dgm:style>
+  </dgm:styleLbl>
+  <dgm:styleLbl name="bgImgPlace1">
+    <dgm:scene3d>
+      <a:camera prst="orthographicFront"/>
+      <a:lightRig rig="threePt" dir="t"/>
+    </dgm:scene3d>
+    <dgm:sp3d/>
+    <dgm:txPr/>
+    <dgm:style>
+      <a:lnRef idx="2">
+        <a:scrgbClr r="0" g="0" b="0"/>
+      </a:lnRef>
+      <a:fillRef idx="1">
+        <a:scrgbClr r="0" g="0" b="0"/>
+      </a:fillRef>
+      <a:effectRef idx="0">
+        <a:scrgbClr r="0" g="0" b="0"/>
+      </a:effectRef>
+      <a:fontRef idx="minor"/>
+    </dgm:style>
+  </dgm:styleLbl>
+  <dgm:styleLbl name="sibTrans2D1">
+    <dgm:scene3d>
+      <a:camera prst="orthographicFront"/>
+      <a:lightRig rig="threePt" dir="t"/>
+    </dgm:scene3d>
+    <dgm:sp3d/>
+    <dgm:txPr/>
+    <dgm:style>
+      <a:lnRef idx="0">
+        <a:scrgbClr r="0" g="0" b="0"/>
+      </a:lnRef>
+      <a:fillRef idx="1">
+        <a:scrgbClr r="0" g="0" b="0"/>
+      </a:fillRef>
+      <a:effectRef idx="0">
+        <a:scrgbClr r="0" g="0" b="0"/>
+      </a:effectRef>
+      <a:fontRef idx="minor">
+        <a:schemeClr val="lt1"/>
+      </a:fontRef>
+    </dgm:style>
+  </dgm:styleLbl>
+  <dgm:styleLbl name="fgSibTrans2D1">
+    <dgm:scene3d>
+      <a:camera prst="orthographicFront"/>
+      <a:lightRig rig="threePt" dir="t"/>
+    </dgm:scene3d>
+    <dgm:sp3d/>
+    <dgm:txPr/>
+    <dgm:style>
+      <a:lnRef idx="0">
+        <a:scrgbClr r="0" g="0" b="0"/>
+      </a:lnRef>
+      <a:fillRef idx="1">
+        <a:scrgbClr r="0" g="0" b="0"/>
+      </a:fillRef>
+      <a:effectRef idx="0">
+        <a:scrgbClr r="0" g="0" b="0"/>
+      </a:effectRef>
+      <a:fontRef idx="minor">
+        <a:schemeClr val="lt1"/>
+      </a:fontRef>
+    </dgm:style>
+  </dgm:styleLbl>
+  <dgm:styleLbl name="bgSibTrans2D1">
+    <dgm:scene3d>
+      <a:camera prst="orthographicFront"/>
+      <a:lightRig rig="threePt" dir="t"/>
+    </dgm:scene3d>
+    <dgm:sp3d/>
+    <dgm:txPr/>
+    <dgm:style>
+      <a:lnRef idx="0">
+        <a:scrgbClr r="0" g="0" b="0"/>
+      </a:lnRef>
+      <a:fillRef idx="1">
+        <a:scrgbClr r="0" g="0" b="0"/>
+      </a:fillRef>
+      <a:effectRef idx="0">
+        <a:scrgbClr r="0" g="0" b="0"/>
+      </a:effectRef>
+      <a:fontRef idx="minor">
+        <a:schemeClr val="lt1"/>
+      </a:fontRef>
+    </dgm:style>
+  </dgm:styleLbl>
+  <dgm:styleLbl name="sibTrans1D1">
+    <dgm:scene3d>
+      <a:camera prst="orthographicFront"/>
+      <a:lightRig rig="threePt" dir="t"/>
+    </dgm:scene3d>
+    <dgm:sp3d/>
+    <dgm:txPr/>
+    <dgm:style>
+      <a:lnRef idx="1">
+        <a:scrgbClr r="0" g="0" b="0"/>
+      </a:lnRef>
+      <a:fillRef idx="0">
+        <a:scrgbClr r="0" g="0" b="0"/>
+      </a:fillRef>
+      <a:effectRef idx="0">
+        <a:scrgbClr r="0" g="0" b="0"/>
+      </a:effectRef>
+      <a:fontRef idx="minor"/>
+    </dgm:style>
+  </dgm:styleLbl>
+  <dgm:styleLbl name="callout">
+    <dgm:scene3d>
+      <a:camera prst="orthographicFront"/>
+      <a:lightRig rig="threePt" dir="t"/>
+    </dgm:scene3d>
+    <dgm:sp3d/>
+    <dgm:txPr/>
+    <dgm:style>
+      <a:lnRef idx="2">
+        <a:scrgbClr r="0" g="0" b="0"/>
+      </a:lnRef>
+      <a:fillRef idx="1">
+        <a:scrgbClr r="0" g="0" b="0"/>
+      </a:fillRef>
+      <a:effectRef idx="0">
+        <a:scrgbClr r="0" g="0" b="0"/>
+      </a:effectRef>
+      <a:fontRef idx="minor"/>
+    </dgm:style>
+  </dgm:styleLbl>
+  <dgm:styleLbl name="asst0">
+    <dgm:scene3d>
+      <a:camera prst="orthographicFront"/>
+      <a:lightRig rig="threePt" dir="t"/>
+    </dgm:scene3d>
+    <dgm:sp3d/>
+    <dgm:txPr/>
+    <dgm:style>
+      <a:lnRef idx="2">
+        <a:scrgbClr r="0" g="0" b="0"/>
+      </a:lnRef>
+      <a:fillRef idx="1">
+        <a:scrgbClr r="0" g="0" b="0"/>
+      </a:fillRef>
+      <a:effectRef idx="0">
+        <a:scrgbClr r="0" g="0" b="0"/>
+      </a:effectRef>
+      <a:fontRef idx="minor">
+        <a:schemeClr val="lt1"/>
+      </a:fontRef>
+    </dgm:style>
+  </dgm:styleLbl>
+  <dgm:styleLbl name="asst1">
+    <dgm:scene3d>
+      <a:camera prst="orthographicFront"/>
+      <a:lightRig rig="threePt" dir="t"/>
+    </dgm:scene3d>
+    <dgm:sp3d/>
+    <dgm:txPr/>
+    <dgm:style>
+      <a:lnRef idx="2">
+        <a:scrgbClr r="0" g="0" b="0"/>
+      </a:lnRef>
+      <a:fillRef idx="1">
+        <a:scrgbClr r="0" g="0" b="0"/>
+      </a:fillRef>
+      <a:effectRef idx="0">
+        <a:scrgbClr r="0" g="0" b="0"/>
+      </a:effectRef>
+      <a:fontRef idx="minor">
+        <a:schemeClr val="lt1"/>
+      </a:fontRef>
+    </dgm:style>
+  </dgm:styleLbl>
+  <dgm:styleLbl name="asst2">
+    <dgm:scene3d>
+      <a:camera prst="orthographicFront"/>
+      <a:lightRig rig="threePt" dir="t"/>
+    </dgm:scene3d>
+    <dgm:sp3d/>
+    <dgm:txPr/>
+    <dgm:style>
+      <a:lnRef idx="2">
+        <a:scrgbClr r="0" g="0" b="0"/>
+      </a:lnRef>
+      <a:fillRef idx="1">
+        <a:scrgbClr r="0" g="0" b="0"/>
+      </a:fillRef>
+      <a:effectRef idx="0">
+        <a:scrgbClr r="0" g="0" b="0"/>
+      </a:effectRef>
+      <a:fontRef idx="minor">
+        <a:schemeClr val="lt1"/>
+      </a:fontRef>
+    </dgm:style>
+  </dgm:styleLbl>
+  <dgm:styleLbl name="asst3">
+    <dgm:scene3d>
+      <a:camera prst="orthographicFront"/>
+      <a:lightRig rig="threePt" dir="t"/>
+    </dgm:scene3d>
+    <dgm:sp3d/>
+    <dgm:txPr/>
+    <dgm:style>
+      <a:lnRef idx="2">
+        <a:scrgbClr r="0" g="0" b="0"/>
+      </a:lnRef>
+      <a:fillRef idx="1">
+        <a:scrgbClr r="0" g="0" b="0"/>
+      </a:fillRef>
+      <a:effectRef idx="0">
+        <a:scrgbClr r="0" g="0" b="0"/>
+      </a:effectRef>
+      <a:fontRef idx="minor">
+        <a:schemeClr val="lt1"/>
+      </a:fontRef>
+    </dgm:style>
+  </dgm:styleLbl>
+  <dgm:styleLbl name="asst4">
+    <dgm:scene3d>
+      <a:camera prst="orthographicFront"/>
+      <a:lightRig rig="threePt" dir="t"/>
+    </dgm:scene3d>
+    <dgm:sp3d/>
+    <dgm:txPr/>
+    <dgm:style>
+      <a:lnRef idx="2">
+        <a:scrgbClr r="0" g="0" b="0"/>
+      </a:lnRef>
+      <a:fillRef idx="1">
+        <a:scrgbClr r="0" g="0" b="0"/>
+      </a:fillRef>
+      <a:effectRef idx="0">
+        <a:scrgbClr r="0" g="0" b="0"/>
+      </a:effectRef>
+      <a:fontRef idx="minor">
+        <a:schemeClr val="lt1"/>
+      </a:fontRef>
+    </dgm:style>
+  </dgm:styleLbl>
+  <dgm:styleLbl name="parChTrans2D1">
+    <dgm:scene3d>
+      <a:camera prst="orthographicFront"/>
+      <a:lightRig rig="threePt" dir="t"/>
+    </dgm:scene3d>
+    <dgm:sp3d/>
+    <dgm:txPr/>
+    <dgm:style>
+      <a:lnRef idx="2">
+        <a:scrgbClr r="0" g="0" b="0"/>
+      </a:lnRef>
+      <a:fillRef idx="1">
+        <a:scrgbClr r="0" g="0" b="0"/>
+      </a:fillRef>
+      <a:effectRef idx="0">
+        <a:scrgbClr r="0" g="0" b="0"/>
+      </a:effectRef>
+      <a:fontRef idx="minor">
+        <a:schemeClr val="lt1"/>
+      </a:fontRef>
+    </dgm:style>
+  </dgm:styleLbl>
+  <dgm:styleLbl name="parChTrans2D2">
+    <dgm:scene3d>
+      <a:camera prst="orthographicFront"/>
+      <a:lightRig rig="threePt" dir="t"/>
+    </dgm:scene3d>
+    <dgm:sp3d/>
+    <dgm:txPr/>
+    <dgm:style>
+      <a:lnRef idx="2">
+        <a:scrgbClr r="0" g="0" b="0"/>
+      </a:lnRef>
+      <a:fillRef idx="1">
+        <a:scrgbClr r="0" g="0" b="0"/>
+      </a:fillRef>
+      <a:effectRef idx="0">
+        <a:scrgbClr r="0" g="0" b="0"/>
+      </a:effectRef>
+      <a:fontRef idx="minor">
+        <a:schemeClr val="lt1"/>
+      </a:fontRef>
+    </dgm:style>
+  </dgm:styleLbl>
+  <dgm:styleLbl name="parChTrans2D3">
+    <dgm:scene3d>
+      <a:camera prst="orthographicFront"/>
+      <a:lightRig rig="threePt" dir="t"/>
+    </dgm:scene3d>
+    <dgm:sp3d/>
+    <dgm:txPr/>
+    <dgm:style>
+      <a:lnRef idx="2">
+        <a:scrgbClr r="0" g="0" b="0"/>
+      </a:lnRef>
+      <a:fillRef idx="1">
+        <a:scrgbClr r="0" g="0" b="0"/>
+      </a:fillRef>
+      <a:effectRef idx="0">
+        <a:scrgbClr r="0" g="0" b="0"/>
+      </a:effectRef>
+      <a:fontRef idx="minor">
+        <a:schemeClr val="lt1"/>
+      </a:fontRef>
+    </dgm:style>
+  </dgm:styleLbl>
+  <dgm:styleLbl name="parChTrans2D4">
+    <dgm:scene3d>
+      <a:camera prst="orthographicFront"/>
+      <a:lightRig rig="threePt" dir="t"/>
+    </dgm:scene3d>
+    <dgm:sp3d/>
+    <dgm:txPr/>
+    <dgm:style>
+      <a:lnRef idx="2">
+        <a:scrgbClr r="0" g="0" b="0"/>
+      </a:lnRef>
+      <a:fillRef idx="1">
+        <a:scrgbClr r="0" g="0" b="0"/>
+      </a:fillRef>
+      <a:effectRef idx="0">
+        <a:scrgbClr r="0" g="0" b="0"/>
+      </a:effectRef>
+      <a:fontRef idx="minor">
+        <a:schemeClr val="lt1"/>
+      </a:fontRef>
+    </dgm:style>
+  </dgm:styleLbl>
+  <dgm:styleLbl name="parChTrans1D1">
+    <dgm:scene3d>
+      <a:camera prst="orthographicFront"/>
+      <a:lightRig rig="threePt" dir="t"/>
+    </dgm:scene3d>
+    <dgm:sp3d/>
+    <dgm:txPr/>
+    <dgm:style>
+      <a:lnRef idx="2">
+        <a:scrgbClr r="0" g="0" b="0"/>
+      </a:lnRef>
+      <a:fillRef idx="0">
+        <a:scrgbClr r="0" g="0" b="0"/>
+      </a:fillRef>
+      <a:effectRef idx="0">
+        <a:scrgbClr r="0" g="0" b="0"/>
+      </a:effectRef>
+      <a:fontRef idx="minor"/>
+    </dgm:style>
+  </dgm:styleLbl>
+  <dgm:styleLbl name="parChTrans1D2">
+    <dgm:scene3d>
+      <a:camera prst="orthographicFront"/>
+      <a:lightRig rig="threePt" dir="t"/>
+    </dgm:scene3d>
+    <dgm:sp3d/>
+    <dgm:txPr/>
+    <dgm:style>
+      <a:lnRef idx="2">
+        <a:scrgbClr r="0" g="0" b="0"/>
+      </a:lnRef>
+      <a:fillRef idx="0">
+        <a:scrgbClr r="0" g="0" b="0"/>
+      </a:fillRef>
+      <a:effectRef idx="0">
+        <a:scrgbClr r="0" g="0" b="0"/>
+      </a:effectRef>
+      <a:fontRef idx="minor"/>
+    </dgm:style>
+  </dgm:styleLbl>
+  <dgm:styleLbl name="parChTrans1D3">
+    <dgm:scene3d>
+      <a:camera prst="orthographicFront"/>
+      <a:lightRig rig="threePt" dir="t"/>
+    </dgm:scene3d>
+    <dgm:sp3d/>
+    <dgm:txPr/>
+    <dgm:style>
+      <a:lnRef idx="2">
+        <a:scrgbClr r="0" g="0" b="0"/>
+      </a:lnRef>
+      <a:fillRef idx="0">
+        <a:scrgbClr r="0" g="0" b="0"/>
+      </a:fillRef>
+      <a:effectRef idx="0">
+        <a:scrgbClr r="0" g="0" b="0"/>
+      </a:effectRef>
+      <a:fontRef idx="minor"/>
+    </dgm:style>
+  </dgm:styleLbl>
+  <dgm:styleLbl name="parChTrans1D4">
+    <dgm:scene3d>
+      <a:camera prst="orthographicFront"/>
+      <a:lightRig rig="threePt" dir="t"/>
+    </dgm:scene3d>
+    <dgm:sp3d/>
+    <dgm:txPr/>
+    <dgm:style>
+      <a:lnRef idx="2">
+        <a:scrgbClr r="0" g="0" b="0"/>
+      </a:lnRef>
+      <a:fillRef idx="0">
+        <a:scrgbClr r="0" g="0" b="0"/>
+      </a:fillRef>
+      <a:effectRef idx="0">
+        <a:scrgbClr r="0" g="0" b="0"/>
+      </a:effectRef>
+      <a:fontRef idx="minor"/>
+    </dgm:style>
+  </dgm:styleLbl>
+  <dgm:styleLbl name="fgAcc1">
+    <dgm:scene3d>
+      <a:camera prst="orthographicFront"/>
+      <a:lightRig rig="threePt" dir="t"/>
+    </dgm:scene3d>
+    <dgm:sp3d/>
+    <dgm:txPr/>
+    <dgm:style>
+      <a:lnRef idx="2">
+        <a:scrgbClr r="0" g="0" b="0"/>
+      </a:lnRef>
+      <a:fillRef idx="1">
+        <a:scrgbClr r="0" g="0" b="0"/>
+      </a:fillRef>
+      <a:effectRef idx="0">
+        <a:scrgbClr r="0" g="0" b="0"/>
+      </a:effectRef>
+      <a:fontRef idx="minor"/>
+    </dgm:style>
+  </dgm:styleLbl>
+  <dgm:styleLbl name="conFgAcc1">
+    <dgm:scene3d>
+      <a:camera prst="orthographicFront"/>
+      <a:lightRig rig="threePt" dir="t"/>
+    </dgm:scene3d>
+    <dgm:sp3d/>
+    <dgm:txPr/>
+    <dgm:style>
+      <a:lnRef idx="2">
+        <a:scrgbClr r="0" g="0" b="0"/>
+      </a:lnRef>
+      <a:fillRef idx="1">
+        <a:scrgbClr r="0" g="0" b="0"/>
+      </a:fillRef>
+      <a:effectRef idx="0">
+        <a:scrgbClr r="0" g="0" b="0"/>
+      </a:effectRef>
+      <a:fontRef idx="minor"/>
+    </dgm:style>
+  </dgm:styleLbl>
+  <dgm:styleLbl name="alignAcc1">
+    <dgm:scene3d>
+      <a:camera prst="orthographicFront"/>
+      <a:lightRig rig="threePt" dir="t"/>
+    </dgm:scene3d>
+    <dgm:sp3d/>
+    <dgm:txPr/>
+    <dgm:style>
+      <a:lnRef idx="2">
+        <a:scrgbClr r="0" g="0" b="0"/>
+      </a:lnRef>
+      <a:fillRef idx="1">
+        <a:scrgbClr r="0" g="0" b="0"/>
+      </a:fillRef>
+      <a:effectRef idx="0">
+        <a:scrgbClr r="0" g="0" b="0"/>
+      </a:effectRef>
+      <a:fontRef idx="minor"/>
+    </dgm:style>
+  </dgm:styleLbl>
+  <dgm:styleLbl name="trAlignAcc1">
+    <dgm:scene3d>
+      <a:camera prst="orthographicFront"/>
+      <a:lightRig rig="threePt" dir="t"/>
+    </dgm:scene3d>
+    <dgm:sp3d/>
+    <dgm:txPr/>
+    <dgm:style>
+      <a:lnRef idx="1">
+        <a:scrgbClr r="0" g="0" b="0"/>
+      </a:lnRef>
+      <a:fillRef idx="1">
+        <a:scrgbClr r="0" g="0" b="0"/>
+      </a:fillRef>
+      <a:effectRef idx="0">
+        <a:scrgbClr r="0" g="0" b="0"/>
+      </a:effectRef>
+      <a:fontRef idx="minor"/>
+    </dgm:style>
+  </dgm:styleLbl>
+  <dgm:styleLbl name="bgAcc1">
+    <dgm:scene3d>
+      <a:camera prst="orthographicFront"/>
+      <a:lightRig rig="threePt" dir="t"/>
+    </dgm:scene3d>
+    <dgm:sp3d/>
+    <dgm:txPr/>
+    <dgm:style>
+      <a:lnRef idx="2">
+        <a:scrgbClr r="0" g="0" b="0"/>
+      </a:lnRef>
+      <a:fillRef idx="1">
+        <a:scrgbClr r="0" g="0" b="0"/>
+      </a:fillRef>
+      <a:effectRef idx="0">
+        <a:scrgbClr r="0" g="0" b="0"/>
+      </a:effectRef>
+      <a:fontRef idx="minor"/>
+    </dgm:style>
+  </dgm:styleLbl>
+  <dgm:styleLbl name="solidFgAcc1">
+    <dgm:scene3d>
+      <a:camera prst="orthographicFront"/>
+      <a:lightRig rig="threePt" dir="t"/>
+    </dgm:scene3d>
+    <dgm:sp3d/>
+    <dgm:txPr/>
+    <dgm:style>
+      <a:lnRef idx="2">
+        <a:scrgbClr r="0" g="0" b="0"/>
+      </a:lnRef>
+      <a:fillRef idx="1">
+        <a:scrgbClr r="0" g="0" b="0"/>
+      </a:fillRef>
+      <a:effectRef idx="0">
+        <a:scrgbClr r="0" g="0" b="0"/>
+      </a:effectRef>
+      <a:fontRef idx="minor"/>
+    </dgm:style>
+  </dgm:styleLbl>
+  <dgm:styleLbl name="solidAlignAcc1">
+    <dgm:scene3d>
+      <a:camera prst="orthographicFront"/>
+      <a:lightRig rig="threePt" dir="t"/>
+    </dgm:scene3d>
+    <dgm:sp3d/>
+    <dgm:txPr/>
+    <dgm:style>
+      <a:lnRef idx="2">
+        <a:scrgbClr r="0" g="0" b="0"/>
+      </a:lnRef>
+      <a:fillRef idx="1">
+        <a:scrgbClr r="0" g="0" b="0"/>
+      </a:fillRef>
+      <a:effectRef idx="0">
+        <a:scrgbClr r="0" g="0" b="0"/>
+      </a:effectRef>
+      <a:fontRef idx="minor"/>
+    </dgm:style>
+  </dgm:styleLbl>
+  <dgm:styleLbl name="solidBgAcc1">
+    <dgm:scene3d>
+      <a:camera prst="orthographicFront"/>
+      <a:lightRig rig="threePt" dir="t"/>
+    </dgm:scene3d>
+    <dgm:sp3d/>
+    <dgm:txPr/>
+    <dgm:style>
+      <a:lnRef idx="2">
+        <a:scrgbClr r="0" g="0" b="0"/>
+      </a:lnRef>
+      <a:fillRef idx="1">
+        <a:scrgbClr r="0" g="0" b="0"/>
+      </a:fillRef>
+      <a:effectRef idx="0">
+        <a:scrgbClr r="0" g="0" b="0"/>
+      </a:effectRef>
+      <a:fontRef idx="minor"/>
+    </dgm:style>
+  </dgm:styleLbl>
+  <dgm:styleLbl name="fgAccFollowNode1">
+    <dgm:scene3d>
+      <a:camera prst="orthographicFront"/>
+      <a:lightRig rig="threePt" dir="t"/>
+    </dgm:scene3d>
+    <dgm:sp3d/>
+    <dgm:txPr/>
+    <dgm:style>
+      <a:lnRef idx="2">
+        <a:scrgbClr r="0" g="0" b="0"/>
+      </a:lnRef>
+      <a:fillRef idx="1">
+        <a:scrgbClr r="0" g="0" b="0"/>
+      </a:fillRef>
+      <a:effectRef idx="0">
+        <a:scrgbClr r="0" g="0" b="0"/>
+      </a:effectRef>
+      <a:fontRef idx="minor"/>
+    </dgm:style>
+  </dgm:styleLbl>
+  <dgm:styleLbl name="alignAccFollowNode1">
+    <dgm:scene3d>
+      <a:camera prst="orthographicFront"/>
+      <a:lightRig rig="threePt" dir="t"/>
+    </dgm:scene3d>
+    <dgm:sp3d/>
+    <dgm:txPr/>
+    <dgm:style>
+      <a:lnRef idx="2">
+        <a:scrgbClr r="0" g="0" b="0"/>
+      </a:lnRef>
+      <a:fillRef idx="1">
+        <a:scrgbClr r="0" g="0" b="0"/>
+      </a:fillRef>
+      <a:effectRef idx="0">
+        <a:scrgbClr r="0" g="0" b="0"/>
+      </a:effectRef>
+      <a:fontRef idx="minor"/>
+    </dgm:style>
+  </dgm:styleLbl>
+  <dgm:styleLbl name="bgAccFollowNode1">
+    <dgm:scene3d>
+      <a:camera prst="orthographicFront"/>
+      <a:lightRig rig="threePt" dir="t"/>
+    </dgm:scene3d>
+    <dgm:sp3d/>
+    <dgm:txPr/>
+    <dgm:style>
+      <a:lnRef idx="2">
+        <a:scrgbClr r="0" g="0" b="0"/>
+      </a:lnRef>
+      <a:fillRef idx="1">
+        <a:scrgbClr r="0" g="0" b="0"/>
+      </a:fillRef>
+      <a:effectRef idx="0">
+        <a:scrgbClr r="0" g="0" b="0"/>
+      </a:effectRef>
+      <a:fontRef idx="minor"/>
+    </dgm:style>
+  </dgm:styleLbl>
+  <dgm:styleLbl name="fgAcc0">
+    <dgm:scene3d>
+      <a:camera prst="orthographicFront"/>
+      <a:lightRig rig="threePt" dir="t"/>
+    </dgm:scene3d>
+    <dgm:sp3d/>
+    <dgm:txPr/>
+    <dgm:style>
+      <a:lnRef idx="2">
+        <a:scrgbClr r="0" g="0" b="0"/>
+      </a:lnRef>
+      <a:fillRef idx="1">
+        <a:scrgbClr r="0" g="0" b="0"/>
+      </a:fillRef>
+      <a:effectRef idx="0">
+        <a:scrgbClr r="0" g="0" b="0"/>
+      </a:effectRef>
+      <a:fontRef idx="minor"/>
+    </dgm:style>
+  </dgm:styleLbl>
+  <dgm:styleLbl name="fgAcc2">
+    <dgm:scene3d>
+      <a:camera prst="orthographicFront"/>
+      <a:lightRig rig="threePt" dir="t"/>
+    </dgm:scene3d>
+    <dgm:sp3d/>
+    <dgm:txPr/>
+    <dgm:style>
+      <a:lnRef idx="2">
+        <a:scrgbClr r="0" g="0" b="0"/>
+      </a:lnRef>
+      <a:fillRef idx="1">
+        <a:scrgbClr r="0" g="0" b="0"/>
+      </a:fillRef>
+      <a:effectRef idx="0">
+        <a:scrgbClr r="0" g="0" b="0"/>
+      </a:effectRef>
+      <a:fontRef idx="minor"/>
+    </dgm:style>
+  </dgm:styleLbl>
+  <dgm:styleLbl name="fgAcc3">
+    <dgm:scene3d>
+      <a:camera prst="orthographicFront"/>
+      <a:lightRig rig="threePt" dir="t"/>
+    </dgm:scene3d>
+    <dgm:sp3d/>
+    <dgm:txPr/>
+    <dgm:style>
+      <a:lnRef idx="2">
+        <a:scrgbClr r="0" g="0" b="0"/>
+      </a:lnRef>
+      <a:fillRef idx="1">
+        <a:scrgbClr r="0" g="0" b="0"/>
+      </a:fillRef>
+      <a:effectRef idx="0">
+        <a:scrgbClr r="0" g="0" b="0"/>
+      </a:effectRef>
+      <a:fontRef idx="minor"/>
+    </dgm:style>
+  </dgm:styleLbl>
+  <dgm:styleLbl name="fgAcc4">
+    <dgm:scene3d>
+      <a:camera prst="orthographicFront"/>
+      <a:lightRig rig="threePt" dir="t"/>
+    </dgm:scene3d>
+    <dgm:sp3d/>
+    <dgm:txPr/>
+    <dgm:style>
+      <a:lnRef idx="2">
+        <a:scrgbClr r="0" g="0" b="0"/>
+      </a:lnRef>
+      <a:fillRef idx="1">
+        <a:scrgbClr r="0" g="0" b="0"/>
+      </a:fillRef>
+      <a:effectRef idx="0">
+        <a:scrgbClr r="0" g="0" b="0"/>
+      </a:effectRef>
+      <a:fontRef idx="minor"/>
+    </dgm:style>
+  </dgm:styleLbl>
+  <dgm:styleLbl name="bgShp">
+    <dgm:scene3d>
+      <a:camera prst="orthographicFront"/>
+      <a:lightRig rig="threePt" dir="t"/>
+    </dgm:scene3d>
+    <dgm:sp3d/>
+    <dgm:txPr/>
+    <dgm:style>
+      <a:lnRef idx="0">
+        <a:scrgbClr r="0" g="0" b="0"/>
+      </a:lnRef>
+      <a:fillRef idx="1">
+        <a:scrgbClr r="0" g="0" b="0"/>
+      </a:fillRef>
+      <a:effectRef idx="0">
+        <a:scrgbClr r="0" g="0" b="0"/>
+      </a:effectRef>
+      <a:fontRef idx="minor"/>
+    </dgm:style>
+  </dgm:styleLbl>
+  <dgm:styleLbl name="dkBgShp">
+    <dgm:scene3d>
+      <a:camera prst="orthographicFront"/>
+      <a:lightRig rig="threePt" dir="t"/>
+    </dgm:scene3d>
+    <dgm:sp3d/>
+    <dgm:txPr/>
+    <dgm:style>
+      <a:lnRef idx="0">
+        <a:scrgbClr r="0" g="0" b="0"/>
+      </a:lnRef>
+      <a:fillRef idx="1">
+        <a:scrgbClr r="0" g="0" b="0"/>
+      </a:fillRef>
+      <a:effectRef idx="0">
+        <a:scrgbClr r="0" g="0" b="0"/>
+      </a:effectRef>
+      <a:fontRef idx="minor"/>
+    </dgm:style>
+  </dgm:styleLbl>
+  <dgm:styleLbl name="trBgShp">
+    <dgm:scene3d>
+      <a:camera prst="orthographicFront"/>
+      <a:lightRig rig="threePt" dir="t"/>
+    </dgm:scene3d>
+    <dgm:sp3d/>
+    <dgm:txPr/>
+    <dgm:style>
+      <a:lnRef idx="0">
+        <a:scrgbClr r="0" g="0" b="0"/>
+      </a:lnRef>
+      <a:fillRef idx="1">
+        <a:scrgbClr r="0" g="0" b="0"/>
+      </a:fillRef>
+      <a:effectRef idx="0">
+        <a:scrgbClr r="0" g="0" b="0"/>
+      </a:effectRef>
+      <a:fontRef idx="minor"/>
+    </dgm:style>
+  </dgm:styleLbl>
+  <dgm:styleLbl name="fgShp">
+    <dgm:scene3d>
+      <a:camera prst="orthographicFront"/>
+      <a:lightRig rig="threePt" dir="t"/>
+    </dgm:scene3d>
+    <dgm:sp3d/>
+    <dgm:txPr/>
+    <dgm:style>
+      <a:lnRef idx="2">
+        <a:scrgbClr r="0" g="0" b="0"/>
+      </a:lnRef>
+      <a:fillRef idx="1">
+        <a:scrgbClr r="0" g="0" b="0"/>
+      </a:fillRef>
+      <a:effectRef idx="0">
+        <a:scrgbClr r="0" g="0" b="0"/>
+      </a:effectRef>
+      <a:fontRef idx="minor"/>
+    </dgm:style>
+  </dgm:styleLbl>
+  <dgm:styleLbl name="revTx">
+    <dgm:scene3d>
+      <a:camera prst="orthographicFront"/>
+      <a:lightRig rig="threePt" dir="t"/>
+    </dgm:scene3d>
+    <dgm:sp3d/>
+    <dgm:txPr/>
+    <dgm:style>
+      <a:lnRef idx="0">
+        <a:scrgbClr r="0" g="0" b="0"/>
+      </a:lnRef>
+      <a:fillRef idx="0">
+        <a:scrgbClr r="0" g="0" b="0"/>
+      </a:fillRef>
+      <a:effectRef idx="0">
+        <a:scrgbClr r="0" g="0" b="0"/>
+      </a:effectRef>
+      <a:fontRef idx="minor"/>
+    </dgm:style>
+  </dgm:styleLbl>
+</dgm:styleDef>
+</file>
+
 <file path=ppt/notesMasters/notesMaster1.xml><?xml version="1.0" encoding="utf-8"?>
 <p:notesMaster xmlns:a="http://schemas.openxmlformats.org/drawingml/2006/main" xmlns:r="http://schemas.openxmlformats.org/officeDocument/2006/relationships" xmlns:p="http://schemas.openxmlformats.org/presentationml/2006/main">
   <p:cSld>
@@ -9301,38 +12338,46 @@
           <a:bodyPr/>
           <a:lstStyle/>
           <a:p>
+            <a:pPr algn="ctr"/>
             <a:r>
-              <a:rPr lang="de-DE" dirty="0"/>
-              <a:t>Warum beliebt?</a:t>
+              <a:rPr lang="de-DE" b="1" dirty="0">
+                <a:latin typeface="Microsoft YaHei UI" panose="020B0503020204020204" pitchFamily="34" charset="-122"/>
+                <a:ea typeface="Microsoft YaHei UI" panose="020B0503020204020204" pitchFamily="34" charset="-122"/>
+              </a:rPr>
+              <a:t>Eigenschaften beliebter Artisten</a:t>
             </a:r>
           </a:p>
         </p:txBody>
       </p:sp>
-      <p:sp>
-        <p:nvSpPr>
-          <p:cNvPr id="3" name="Content Placeholder 2">
+      <p:pic>
+        <p:nvPicPr>
+          <p:cNvPr id="7" name="Content Placeholder 6" descr="Chart&#10;&#10;Description automatically generated">
             <a:extLst>
               <a:ext uri="{FF2B5EF4-FFF2-40B4-BE49-F238E27FC236}">
-                <a16:creationId xmlns:a16="http://schemas.microsoft.com/office/drawing/2014/main" id="{22D1471C-A890-5709-3AD9-55A0A3743771}"/>
+                <a16:creationId xmlns:a16="http://schemas.microsoft.com/office/drawing/2014/main" id="{9BD64AD6-BCF8-DA60-3A97-F852DF038013}"/>
               </a:ext>
             </a:extLst>
           </p:cNvPr>
-          <p:cNvSpPr>
-            <a:spLocks noGrp="1"/>
-          </p:cNvSpPr>
+          <p:cNvPicPr>
+            <a:picLocks noGrp="1" noChangeAspect="1"/>
+          </p:cNvPicPr>
           <p:nvPr>
             <p:ph idx="1"/>
           </p:nvPr>
-        </p:nvSpPr>
-        <p:spPr/>
-        <p:txBody>
-          <a:bodyPr/>
-          <a:lstStyle/>
-          <a:p>
-            <a:endParaRPr lang="de-DE"/>
-          </a:p>
-        </p:txBody>
-      </p:sp>
+        </p:nvPicPr>
+        <p:blipFill>
+          <a:blip r:embed="rId2"/>
+          <a:stretch>
+            <a:fillRect/>
+          </a:stretch>
+        </p:blipFill>
+        <p:spPr>
+          <a:xfrm>
+            <a:off x="313889" y="2112882"/>
+            <a:ext cx="11564221" cy="2632236"/>
+          </a:xfrm>
+        </p:spPr>
+      </p:pic>
     </p:spTree>
     <p:extLst>
       <p:ext uri="{BB962C8B-B14F-4D97-AF65-F5344CB8AC3E}">
@@ -9747,8 +12792,8 @@
           </a:graphicData>
         </a:graphic>
       </p:graphicFrame>
-      <mc:AlternateContent xmlns:mc="http://schemas.openxmlformats.org/markup-compatibility/2006">
-        <mc:Choice xmlns:cx2="http://schemas.microsoft.com/office/drawing/2015/10/21/chartex" Requires="cx2">
+      <mc:AlternateContent xmlns:mc="http://schemas.openxmlformats.org/markup-compatibility/2006" xmlns:cx2="http://schemas.microsoft.com/office/drawing/2015/10/21/chartex">
+        <mc:Choice Requires="cx2">
           <p:graphicFrame>
             <p:nvGraphicFramePr>
               <p:cNvPr id="7" name="Chart 6">
@@ -9778,7 +12823,7 @@
             </a:graphic>
           </p:graphicFrame>
         </mc:Choice>
-        <mc:Fallback>
+        <mc:Fallback xmlns="">
           <p:pic>
             <p:nvPicPr>
               <p:cNvPr id="7" name="Chart 6">
@@ -9913,7 +12958,7 @@
                 <a:latin typeface="Microsoft YaHei UI" panose="020B0503020204020204" pitchFamily="34" charset="-122"/>
                 <a:ea typeface="Microsoft YaHei UI" panose="020B0503020204020204" pitchFamily="34" charset="-122"/>
               </a:rPr>
-              <a:t>Eigenschaften von beliebten Songs</a:t>
+              <a:t>Eigenschaften beliebter Songs</a:t>
             </a:r>
           </a:p>
         </p:txBody>
@@ -9934,16 +12979,15 @@
             <p:ph idx="1"/>
           </p:nvPr>
         </p:nvPicPr>
-        <p:blipFill>
+        <p:blipFill rotWithShape="1">
           <a:blip r:embed="rId2"/>
-          <a:stretch>
-            <a:fillRect/>
-          </a:stretch>
+          <a:srcRect l="3581" t="5637" r="8529"/>
+          <a:stretch/>
         </p:blipFill>
         <p:spPr>
           <a:xfrm>
-            <a:off x="216254" y="2391509"/>
-            <a:ext cx="11759492" cy="2580818"/>
+            <a:off x="189889" y="2396835"/>
+            <a:ext cx="11812222" cy="2783309"/>
           </a:xfrm>
           <a:prstGeom prst="rect">
             <a:avLst/>
@@ -11518,8 +14562,8 @@
         </p:nvSpPr>
         <p:spPr>
           <a:xfrm>
-            <a:off x="6280239" y="2036793"/>
-            <a:ext cx="4437509" cy="440319"/>
+            <a:off x="5995090" y="2081916"/>
+            <a:ext cx="5232888" cy="440319"/>
           </a:xfrm>
           <a:prstGeom prst="rect">
             <a:avLst/>
@@ -11527,42 +14571,58 @@
         </p:spPr>
         <p:txBody>
           <a:bodyPr vert="horz" lIns="91440" tIns="45720" rIns="91440" bIns="45720" rtlCol="0">
-            <a:normAutofit/>
+            <a:noAutofit/>
           </a:bodyPr>
           <a:lstStyle/>
           <a:p>
-            <a:pPr indent="-228600">
+            <a:pPr>
               <a:lnSpc>
                 <a:spcPct val="90000"/>
               </a:lnSpc>
               <a:spcAft>
                 <a:spcPts val="600"/>
               </a:spcAft>
-              <a:buFont typeface="Arial" panose="020B0604020202020204" pitchFamily="34" charset="0"/>
-              <a:buChar char="•"/>
             </a:pPr>
             <a:r>
-              <a:rPr lang="en-US" sz="1900" dirty="0" err="1"/>
+              <a:rPr lang="en-US" sz="2000" b="1" dirty="0" err="1">
+                <a:latin typeface="Microsoft YaHei UI" panose="020B0503020204020204" pitchFamily="34" charset="-122"/>
+                <a:ea typeface="Microsoft YaHei UI" panose="020B0503020204020204" pitchFamily="34" charset="-122"/>
+              </a:rPr>
               <a:t>generiert</a:t>
             </a:r>
             <a:r>
-              <a:rPr lang="en-US" sz="1900" dirty="0"/>
+              <a:rPr lang="en-US" sz="2000" b="1" dirty="0">
+                <a:latin typeface="Microsoft YaHei UI" panose="020B0503020204020204" pitchFamily="34" charset="-122"/>
+                <a:ea typeface="Microsoft YaHei UI" panose="020B0503020204020204" pitchFamily="34" charset="-122"/>
+              </a:rPr>
               <a:t> </a:t>
             </a:r>
             <a:r>
-              <a:rPr lang="en-US" sz="1900" dirty="0" err="1"/>
-              <a:t>durch</a:t>
+              <a:rPr lang="en-US" sz="2000" b="1" dirty="0" err="1">
+                <a:latin typeface="Microsoft YaHei UI" panose="020B0503020204020204" pitchFamily="34" charset="-122"/>
+                <a:ea typeface="Microsoft YaHei UI" panose="020B0503020204020204" pitchFamily="34" charset="-122"/>
+              </a:rPr>
+              <a:t>mittels</a:t>
             </a:r>
             <a:r>
-              <a:rPr lang="en-US" sz="1900" dirty="0"/>
+              <a:rPr lang="en-US" sz="2000" b="1" dirty="0">
+                <a:latin typeface="Microsoft YaHei UI" panose="020B0503020204020204" pitchFamily="34" charset="-122"/>
+                <a:ea typeface="Microsoft YaHei UI" panose="020B0503020204020204" pitchFamily="34" charset="-122"/>
+              </a:rPr>
               <a:t> </a:t>
             </a:r>
             <a:r>
-              <a:rPr lang="en-US" sz="1900" dirty="0" err="1"/>
+              <a:rPr lang="en-US" sz="2000" b="1" dirty="0" err="1">
+                <a:latin typeface="Microsoft YaHei UI" panose="020B0503020204020204" pitchFamily="34" charset="-122"/>
+                <a:ea typeface="Microsoft YaHei UI" panose="020B0503020204020204" pitchFamily="34" charset="-122"/>
+              </a:rPr>
               <a:t>offizieller</a:t>
             </a:r>
             <a:r>
-              <a:rPr lang="en-US" sz="1900" dirty="0"/>
+              <a:rPr lang="en-US" sz="2000" b="1" dirty="0">
+                <a:latin typeface="Microsoft YaHei UI" panose="020B0503020204020204" pitchFamily="34" charset="-122"/>
+                <a:ea typeface="Microsoft YaHei UI" panose="020B0503020204020204" pitchFamily="34" charset="-122"/>
+              </a:rPr>
               <a:t> Spotify API</a:t>
             </a:r>
           </a:p>
@@ -11746,7 +14806,7 @@
         </p:nvSpPr>
         <p:spPr>
           <a:xfrm>
-            <a:off x="7449233" y="2908053"/>
+            <a:off x="7061306" y="2569062"/>
             <a:ext cx="2319059" cy="1325563"/>
           </a:xfrm>
         </p:spPr>
@@ -11757,27 +14817,80 @@
           <a:lstStyle/>
           <a:p>
             <a:r>
-              <a:rPr lang="en-US" sz="2000" dirty="0"/>
+              <a:rPr lang="en-US" sz="2000" b="1" dirty="0">
+                <a:latin typeface="Microsoft YaHei UI" panose="020B0503020204020204" pitchFamily="34" charset="-122"/>
+                <a:ea typeface="Microsoft YaHei UI" panose="020B0503020204020204" pitchFamily="34" charset="-122"/>
+              </a:rPr>
               <a:t>162k playlists</a:t>
             </a:r>
           </a:p>
           <a:p>
             <a:r>
-              <a:rPr lang="en-US" sz="2000" dirty="0"/>
+              <a:rPr lang="en-US" sz="2000" b="1" dirty="0">
+                <a:latin typeface="Microsoft YaHei UI" panose="020B0503020204020204" pitchFamily="34" charset="-122"/>
+                <a:ea typeface="Microsoft YaHei UI" panose="020B0503020204020204" pitchFamily="34" charset="-122"/>
+              </a:rPr>
               <a:t>16k user</a:t>
             </a:r>
           </a:p>
           <a:p>
             <a:r>
-              <a:rPr lang="en-US" sz="2000" dirty="0"/>
+              <a:rPr lang="en-US" sz="2000" b="1" dirty="0">
+                <a:latin typeface="Microsoft YaHei UI" panose="020B0503020204020204" pitchFamily="34" charset="-122"/>
+                <a:ea typeface="Microsoft YaHei UI" panose="020B0503020204020204" pitchFamily="34" charset="-122"/>
+              </a:rPr>
               <a:t>2M tracks</a:t>
             </a:r>
           </a:p>
           <a:p>
-            <a:endParaRPr lang="en-US" sz="2000" dirty="0"/>
+            <a:endParaRPr lang="en-US" sz="2000" b="1" dirty="0">
+              <a:latin typeface="Microsoft YaHei UI" panose="020B0503020204020204" pitchFamily="34" charset="-122"/>
+              <a:ea typeface="Microsoft YaHei UI" panose="020B0503020204020204" pitchFamily="34" charset="-122"/>
+            </a:endParaRPr>
           </a:p>
           <a:p>
-            <a:endParaRPr lang="en-US" sz="2000" dirty="0"/>
+            <a:endParaRPr lang="en-US" sz="2000" b="1" dirty="0">
+              <a:latin typeface="Microsoft YaHei UI" panose="020B0503020204020204" pitchFamily="34" charset="-122"/>
+              <a:ea typeface="Microsoft YaHei UI" panose="020B0503020204020204" pitchFamily="34" charset="-122"/>
+            </a:endParaRPr>
+          </a:p>
+        </p:txBody>
+      </p:sp>
+      <p:sp>
+        <p:nvSpPr>
+          <p:cNvPr id="3" name="TextBox 2">
+            <a:extLst>
+              <a:ext uri="{FF2B5EF4-FFF2-40B4-BE49-F238E27FC236}">
+                <a16:creationId xmlns:a16="http://schemas.microsoft.com/office/drawing/2014/main" id="{BAA22FB2-0F1B-1556-3B43-691DF355EB66}"/>
+              </a:ext>
+            </a:extLst>
+          </p:cNvPr>
+          <p:cNvSpPr txBox="1"/>
+          <p:nvPr/>
+        </p:nvSpPr>
+        <p:spPr>
+          <a:xfrm>
+            <a:off x="6789437" y="1922488"/>
+            <a:ext cx="1319592" cy="461665"/>
+          </a:xfrm>
+          <a:prstGeom prst="rect">
+            <a:avLst/>
+          </a:prstGeom>
+          <a:noFill/>
+        </p:spPr>
+        <p:txBody>
+          <a:bodyPr wrap="none" rtlCol="0">
+            <a:spAutoFit/>
+          </a:bodyPr>
+          <a:lstStyle/>
+          <a:p>
+            <a:r>
+              <a:rPr lang="de-DE" sz="2400" b="1" dirty="0">
+                <a:latin typeface="Microsoft YaHei UI" panose="020B0503020204020204" pitchFamily="34" charset="-122"/>
+                <a:ea typeface="Microsoft YaHei UI" panose="020B0503020204020204" pitchFamily="34" charset="-122"/>
+              </a:rPr>
+              <a:t>Zahlen:</a:t>
+            </a:r>
           </a:p>
         </p:txBody>
       </p:sp>
@@ -13456,21 +16569,7 @@
                 <a:latin typeface="Microsoft YaHei UI" panose="020B0503020204020204" pitchFamily="34" charset="-122"/>
                 <a:ea typeface="Microsoft YaHei UI" panose="020B0503020204020204" pitchFamily="34" charset="-122"/>
               </a:rPr>
-              <a:t>Connection </a:t>
-            </a:r>
-            <a:r>
-              <a:rPr lang="de-DE" b="1" dirty="0" err="1">
-                <a:latin typeface="Microsoft YaHei UI" panose="020B0503020204020204" pitchFamily="34" charset="-122"/>
-                <a:ea typeface="Microsoft YaHei UI" panose="020B0503020204020204" pitchFamily="34" charset="-122"/>
-              </a:rPr>
-              <a:t>of</a:t>
-            </a:r>
-            <a:r>
-              <a:rPr lang="de-DE" b="1" dirty="0">
-                <a:latin typeface="Microsoft YaHei UI" panose="020B0503020204020204" pitchFamily="34" charset="-122"/>
-                <a:ea typeface="Microsoft YaHei UI" panose="020B0503020204020204" pitchFamily="34" charset="-122"/>
-              </a:rPr>
-              <a:t> Datasets</a:t>
+              <a:t>Verbindung der Datensätze</a:t>
             </a:r>
           </a:p>
         </p:txBody>
@@ -15839,43 +18938,481 @@
           <a:bodyPr/>
           <a:lstStyle/>
           <a:p>
+            <a:pPr algn="ctr"/>
             <a:r>
-              <a:rPr lang="de-DE" dirty="0"/>
-              <a:t>Was ist durch </a:t>
+              <a:rPr lang="de-DE" b="1" dirty="0">
+                <a:latin typeface="Microsoft YaHei UI" panose="020B0503020204020204" pitchFamily="34" charset="-122"/>
+                <a:ea typeface="Microsoft YaHei UI" panose="020B0503020204020204" pitchFamily="34" charset="-122"/>
+              </a:rPr>
+              <a:t>Datenverlust</a:t>
             </a:r>
+          </a:p>
+        </p:txBody>
+      </p:sp>
+      <p:graphicFrame>
+        <p:nvGraphicFramePr>
+          <p:cNvPr id="6" name="Diagram 5">
+            <a:extLst>
+              <a:ext uri="{FF2B5EF4-FFF2-40B4-BE49-F238E27FC236}">
+                <a16:creationId xmlns:a16="http://schemas.microsoft.com/office/drawing/2014/main" id="{311518C1-2D45-0D54-FD5D-3740F546ED90}"/>
+              </a:ext>
+            </a:extLst>
+          </p:cNvPr>
+          <p:cNvGraphicFramePr/>
+          <p:nvPr>
+            <p:extLst>
+              <p:ext uri="{D42A27DB-BD31-4B8C-83A1-F6EECF244321}">
+                <p14:modId xmlns:p14="http://schemas.microsoft.com/office/powerpoint/2010/main" val="1136467530"/>
+              </p:ext>
+            </p:extLst>
+          </p:nvPr>
+        </p:nvGraphicFramePr>
+        <p:xfrm>
+          <a:off x="841480" y="2561747"/>
+          <a:ext cx="5641109" cy="3709169"/>
+        </p:xfrm>
+        <a:graphic>
+          <a:graphicData uri="http://schemas.openxmlformats.org/drawingml/2006/diagram">
+            <dgm:relIds xmlns:dgm="http://schemas.openxmlformats.org/drawingml/2006/diagram" xmlns:r="http://schemas.openxmlformats.org/officeDocument/2006/relationships" r:dm="rId3" r:lo="rId4" r:qs="rId5" r:cs="rId6"/>
+          </a:graphicData>
+        </a:graphic>
+      </p:graphicFrame>
+      <p:sp>
+        <p:nvSpPr>
+          <p:cNvPr id="7" name="TextBox 6">
+            <a:extLst>
+              <a:ext uri="{FF2B5EF4-FFF2-40B4-BE49-F238E27FC236}">
+                <a16:creationId xmlns:a16="http://schemas.microsoft.com/office/drawing/2014/main" id="{52778409-2088-51E8-E452-251AFA9929F5}"/>
+              </a:ext>
+            </a:extLst>
+          </p:cNvPr>
+          <p:cNvSpPr txBox="1"/>
+          <p:nvPr/>
+        </p:nvSpPr>
+        <p:spPr>
+          <a:xfrm>
+            <a:off x="3273413" y="5695690"/>
+            <a:ext cx="1210588" cy="400110"/>
+          </a:xfrm>
+          <a:prstGeom prst="rect">
+            <a:avLst/>
+          </a:prstGeom>
+          <a:noFill/>
+        </p:spPr>
+        <p:txBody>
+          <a:bodyPr wrap="none" rtlCol="0">
+            <a:spAutoFit/>
+          </a:bodyPr>
+          <a:lstStyle/>
+          <a:p>
             <a:r>
-              <a:rPr lang="de-DE" dirty="0" err="1"/>
-              <a:t>merge</a:t>
+              <a:rPr lang="de-DE" sz="2000" b="1" dirty="0">
+                <a:latin typeface="Microsoft YaHei UI" panose="020B0503020204020204" pitchFamily="34" charset="-122"/>
+                <a:ea typeface="Microsoft YaHei UI" panose="020B0503020204020204" pitchFamily="34" charset="-122"/>
+              </a:rPr>
+              <a:t>147.280</a:t>
             </a:r>
+            <a:endParaRPr lang="de-DE" b="1" dirty="0">
+              <a:latin typeface="Microsoft YaHei UI" panose="020B0503020204020204" pitchFamily="34" charset="-122"/>
+              <a:ea typeface="Microsoft YaHei UI" panose="020B0503020204020204" pitchFamily="34" charset="-122"/>
+            </a:endParaRPr>
+          </a:p>
+        </p:txBody>
+      </p:sp>
+      <p:sp>
+        <p:nvSpPr>
+          <p:cNvPr id="8" name="TextBox 7">
+            <a:extLst>
+              <a:ext uri="{FF2B5EF4-FFF2-40B4-BE49-F238E27FC236}">
+                <a16:creationId xmlns:a16="http://schemas.microsoft.com/office/drawing/2014/main" id="{9040000E-DEE5-0D23-DA44-97339CCAACBF}"/>
+              </a:ext>
+            </a:extLst>
+          </p:cNvPr>
+          <p:cNvSpPr txBox="1"/>
+          <p:nvPr/>
+        </p:nvSpPr>
+        <p:spPr>
+          <a:xfrm>
+            <a:off x="851179" y="3223799"/>
+            <a:ext cx="2930867" cy="461665"/>
+          </a:xfrm>
+          <a:prstGeom prst="rect">
+            <a:avLst/>
+          </a:prstGeom>
+          <a:noFill/>
+        </p:spPr>
+        <p:txBody>
+          <a:bodyPr wrap="none" rtlCol="0">
+            <a:spAutoFit/>
+          </a:bodyPr>
+          <a:lstStyle/>
+          <a:p>
             <a:r>
-              <a:rPr lang="de-DE" dirty="0"/>
-              <a:t> verloren gegangen</a:t>
+              <a:rPr lang="de-DE" sz="2400" b="1" dirty="0">
+                <a:latin typeface="Microsoft YaHei UI" panose="020B0503020204020204" pitchFamily="34" charset="-122"/>
+                <a:ea typeface="Microsoft YaHei UI" panose="020B0503020204020204" pitchFamily="34" charset="-122"/>
+              </a:rPr>
+              <a:t>Playlist Datensatz</a:t>
             </a:r>
           </a:p>
         </p:txBody>
       </p:sp>
       <p:sp>
         <p:nvSpPr>
-          <p:cNvPr id="3" name="Content Placeholder 2">
+          <p:cNvPr id="9" name="TextBox 8">
             <a:extLst>
               <a:ext uri="{FF2B5EF4-FFF2-40B4-BE49-F238E27FC236}">
-                <a16:creationId xmlns:a16="http://schemas.microsoft.com/office/drawing/2014/main" id="{5F7640F4-0A08-E525-0CD0-CEB1E381F011}"/>
+                <a16:creationId xmlns:a16="http://schemas.microsoft.com/office/drawing/2014/main" id="{488F94D6-187F-2BEA-4558-3EB820B58E84}"/>
               </a:ext>
             </a:extLst>
           </p:cNvPr>
-          <p:cNvSpPr>
-            <a:spLocks noGrp="1"/>
-          </p:cNvSpPr>
-          <p:nvPr>
-            <p:ph idx="1"/>
-          </p:nvPr>
+          <p:cNvSpPr txBox="1"/>
+          <p:nvPr/>
         </p:nvSpPr>
-        <p:spPr/>
+        <p:spPr>
+          <a:xfrm>
+            <a:off x="4407551" y="3436221"/>
+            <a:ext cx="2611869" cy="461665"/>
+          </a:xfrm>
+          <a:prstGeom prst="rect">
+            <a:avLst/>
+          </a:prstGeom>
+          <a:noFill/>
+        </p:spPr>
         <p:txBody>
-          <a:bodyPr/>
+          <a:bodyPr wrap="none" rtlCol="0">
+            <a:spAutoFit/>
+          </a:bodyPr>
           <a:lstStyle/>
           <a:p>
-            <a:endParaRPr lang="de-DE"/>
+            <a:r>
+              <a:rPr lang="de-DE" sz="2400" b="1" dirty="0">
+                <a:latin typeface="Microsoft YaHei UI" panose="020B0503020204020204" pitchFamily="34" charset="-122"/>
+                <a:ea typeface="Microsoft YaHei UI" panose="020B0503020204020204" pitchFamily="34" charset="-122"/>
+              </a:rPr>
+              <a:t>Song Datensatz</a:t>
+            </a:r>
+          </a:p>
+        </p:txBody>
+      </p:sp>
+      <p:sp>
+        <p:nvSpPr>
+          <p:cNvPr id="10" name="TextBox 9">
+            <a:extLst>
+              <a:ext uri="{FF2B5EF4-FFF2-40B4-BE49-F238E27FC236}">
+                <a16:creationId xmlns:a16="http://schemas.microsoft.com/office/drawing/2014/main" id="{530350D9-14FB-9235-E5D9-CAEB73BD7993}"/>
+              </a:ext>
+            </a:extLst>
+          </p:cNvPr>
+          <p:cNvSpPr txBox="1"/>
+          <p:nvPr/>
+        </p:nvSpPr>
+        <p:spPr>
+          <a:xfrm>
+            <a:off x="838200" y="2038527"/>
+            <a:ext cx="5807872" cy="523220"/>
+          </a:xfrm>
+          <a:prstGeom prst="rect">
+            <a:avLst/>
+          </a:prstGeom>
+          <a:noFill/>
+        </p:spPr>
+        <p:txBody>
+          <a:bodyPr wrap="none" rtlCol="0">
+            <a:spAutoFit/>
+          </a:bodyPr>
+          <a:lstStyle/>
+          <a:p>
+            <a:r>
+              <a:rPr lang="de-DE" sz="2800" b="1" dirty="0">
+                <a:latin typeface="Microsoft YaHei UI" panose="020B0503020204020204" pitchFamily="34" charset="-122"/>
+                <a:ea typeface="Microsoft YaHei UI" panose="020B0503020204020204" pitchFamily="34" charset="-122"/>
+              </a:rPr>
+              <a:t>Anzahl an Songs pro Datensatz</a:t>
+            </a:r>
+          </a:p>
+        </p:txBody>
+      </p:sp>
+      <p:cxnSp>
+        <p:nvCxnSpPr>
+          <p:cNvPr id="12" name="Straight Connector 11">
+            <a:extLst>
+              <a:ext uri="{FF2B5EF4-FFF2-40B4-BE49-F238E27FC236}">
+                <a16:creationId xmlns:a16="http://schemas.microsoft.com/office/drawing/2014/main" id="{5E8A73A3-3902-361E-23C8-FF262D2445F8}"/>
+              </a:ext>
+            </a:extLst>
+          </p:cNvPr>
+          <p:cNvCxnSpPr>
+            <a:cxnSpLocks/>
+          </p:cNvCxnSpPr>
+          <p:nvPr/>
+        </p:nvCxnSpPr>
+        <p:spPr>
+          <a:xfrm flipH="1">
+            <a:off x="3742135" y="4502727"/>
+            <a:ext cx="178701" cy="1149928"/>
+          </a:xfrm>
+          <a:prstGeom prst="line">
+            <a:avLst/>
+          </a:prstGeom>
+          <a:ln w="38100">
+            <a:solidFill>
+              <a:schemeClr val="tx1"/>
+            </a:solidFill>
+          </a:ln>
+        </p:spPr>
+        <p:style>
+          <a:lnRef idx="1">
+            <a:schemeClr val="accent1"/>
+          </a:lnRef>
+          <a:fillRef idx="0">
+            <a:schemeClr val="accent1"/>
+          </a:fillRef>
+          <a:effectRef idx="0">
+            <a:schemeClr val="accent1"/>
+          </a:effectRef>
+          <a:fontRef idx="minor">
+            <a:schemeClr val="tx1"/>
+          </a:fontRef>
+        </p:style>
+      </p:cxnSp>
+      <p:sp>
+        <p:nvSpPr>
+          <p:cNvPr id="18" name="TextBox 17">
+            <a:extLst>
+              <a:ext uri="{FF2B5EF4-FFF2-40B4-BE49-F238E27FC236}">
+                <a16:creationId xmlns:a16="http://schemas.microsoft.com/office/drawing/2014/main" id="{21CCB9F8-1E36-3472-D7A5-329B6ECC49BD}"/>
+              </a:ext>
+            </a:extLst>
+          </p:cNvPr>
+          <p:cNvSpPr txBox="1"/>
+          <p:nvPr/>
+        </p:nvSpPr>
+        <p:spPr>
+          <a:xfrm>
+            <a:off x="8625580" y="2038527"/>
+            <a:ext cx="1584216" cy="461665"/>
+          </a:xfrm>
+          <a:prstGeom prst="rect">
+            <a:avLst/>
+          </a:prstGeom>
+          <a:noFill/>
+        </p:spPr>
+        <p:txBody>
+          <a:bodyPr wrap="none" rtlCol="0">
+            <a:spAutoFit/>
+          </a:bodyPr>
+          <a:lstStyle/>
+          <a:p>
+            <a:r>
+              <a:rPr lang="de-DE" sz="2400" b="1" dirty="0">
+                <a:latin typeface="Microsoft YaHei UI" panose="020B0503020204020204" pitchFamily="34" charset="-122"/>
+                <a:ea typeface="Microsoft YaHei UI" panose="020B0503020204020204" pitchFamily="34" charset="-122"/>
+              </a:rPr>
+              <a:t>Problem:</a:t>
+            </a:r>
+          </a:p>
+        </p:txBody>
+      </p:sp>
+      <p:sp>
+        <p:nvSpPr>
+          <p:cNvPr id="20" name="TextBox 19">
+            <a:extLst>
+              <a:ext uri="{FF2B5EF4-FFF2-40B4-BE49-F238E27FC236}">
+                <a16:creationId xmlns:a16="http://schemas.microsoft.com/office/drawing/2014/main" id="{BCC2C69A-506C-6643-E608-670173D49B3C}"/>
+              </a:ext>
+            </a:extLst>
+          </p:cNvPr>
+          <p:cNvSpPr txBox="1"/>
+          <p:nvPr/>
+        </p:nvSpPr>
+        <p:spPr>
+          <a:xfrm>
+            <a:off x="7863580" y="2617198"/>
+            <a:ext cx="4138762" cy="461665"/>
+          </a:xfrm>
+          <a:prstGeom prst="rect">
+            <a:avLst/>
+          </a:prstGeom>
+          <a:noFill/>
+        </p:spPr>
+        <p:txBody>
+          <a:bodyPr wrap="none" rtlCol="0">
+            <a:spAutoFit/>
+          </a:bodyPr>
+          <a:lstStyle/>
+          <a:p>
+            <a:r>
+              <a:rPr lang="de-DE" sz="2400" b="1" dirty="0">
+                <a:latin typeface="Microsoft YaHei UI" panose="020B0503020204020204" pitchFamily="34" charset="-122"/>
+                <a:ea typeface="Microsoft YaHei UI" panose="020B0503020204020204" pitchFamily="34" charset="-122"/>
+              </a:rPr>
+              <a:t>Verbindung über Artisten</a:t>
+            </a:r>
+          </a:p>
+        </p:txBody>
+      </p:sp>
+      <p:sp>
+        <p:nvSpPr>
+          <p:cNvPr id="21" name="TextBox 20">
+            <a:extLst>
+              <a:ext uri="{FF2B5EF4-FFF2-40B4-BE49-F238E27FC236}">
+                <a16:creationId xmlns:a16="http://schemas.microsoft.com/office/drawing/2014/main" id="{F0B2EBBF-2106-06B8-04F5-E78269C6B4D2}"/>
+              </a:ext>
+            </a:extLst>
+          </p:cNvPr>
+          <p:cNvSpPr txBox="1"/>
+          <p:nvPr/>
+        </p:nvSpPr>
+        <p:spPr>
+          <a:xfrm>
+            <a:off x="7486907" y="3516977"/>
+            <a:ext cx="4596130" cy="2125967"/>
+          </a:xfrm>
+          <a:prstGeom prst="rect">
+            <a:avLst/>
+          </a:prstGeom>
+          <a:noFill/>
+        </p:spPr>
+        <p:txBody>
+          <a:bodyPr wrap="none" rtlCol="0">
+            <a:spAutoFit/>
+          </a:bodyPr>
+          <a:lstStyle/>
+          <a:p>
+            <a:pPr>
+              <a:lnSpc>
+                <a:spcPct val="150000"/>
+              </a:lnSpc>
+            </a:pPr>
+            <a:r>
+              <a:rPr lang="en-GB" b="0" i="0" dirty="0">
+                <a:solidFill>
+                  <a:srgbClr val="5F6368"/>
+                </a:solidFill>
+                <a:effectLst/>
+                <a:latin typeface="Roboto Mono" panose="020F0502020204030204" pitchFamily="34" charset="0"/>
+              </a:rPr>
+              <a:t>Elvis Costello</a:t>
+            </a:r>
+          </a:p>
+          <a:p>
+            <a:pPr>
+              <a:lnSpc>
+                <a:spcPct val="150000"/>
+              </a:lnSpc>
+            </a:pPr>
+            <a:r>
+              <a:rPr lang="en-GB" b="0" i="0" dirty="0">
+                <a:solidFill>
+                  <a:srgbClr val="5F6368"/>
+                </a:solidFill>
+                <a:effectLst/>
+                <a:latin typeface="Roboto Mono" pitchFamily="49" charset="0"/>
+              </a:rPr>
+              <a:t>Elvis Costello &amp; The Attractions</a:t>
+            </a:r>
+            <a:endParaRPr lang="en-GB" dirty="0">
+              <a:solidFill>
+                <a:srgbClr val="5F6368"/>
+              </a:solidFill>
+              <a:latin typeface="Roboto Mono" panose="020F0502020204030204" pitchFamily="34" charset="0"/>
+            </a:endParaRPr>
+          </a:p>
+          <a:p>
+            <a:pPr>
+              <a:lnSpc>
+                <a:spcPct val="150000"/>
+              </a:lnSpc>
+            </a:pPr>
+            <a:r>
+              <a:rPr lang="en-GB" b="0" i="0" dirty="0">
+                <a:solidFill>
+                  <a:srgbClr val="5F6368"/>
+                </a:solidFill>
+                <a:effectLst/>
+                <a:latin typeface="Roboto Mono" pitchFamily="49" charset="0"/>
+              </a:rPr>
+              <a:t>Paul McCartney &amp; Eric Clapton</a:t>
+            </a:r>
+            <a:endParaRPr lang="en-GB" b="0" i="0" dirty="0">
+              <a:solidFill>
+                <a:srgbClr val="5F6368"/>
+              </a:solidFill>
+              <a:effectLst/>
+              <a:latin typeface="Roboto Mono" panose="020F0502020204030204" pitchFamily="34" charset="0"/>
+            </a:endParaRPr>
+          </a:p>
+          <a:p>
+            <a:pPr>
+              <a:lnSpc>
+                <a:spcPct val="150000"/>
+              </a:lnSpc>
+            </a:pPr>
+            <a:r>
+              <a:rPr lang="en-GB" b="0" i="0" dirty="0">
+                <a:solidFill>
+                  <a:srgbClr val="5F6368"/>
+                </a:solidFill>
+                <a:effectLst/>
+                <a:latin typeface="Roboto Mono" pitchFamily="49" charset="0"/>
+              </a:rPr>
+              <a:t>Tom Petty And The Heartbreakers</a:t>
+            </a:r>
+            <a:endParaRPr lang="en-GB" dirty="0">
+              <a:solidFill>
+                <a:srgbClr val="5F6368"/>
+              </a:solidFill>
+              <a:latin typeface="Roboto Mono" panose="020F0502020204030204" pitchFamily="34" charset="0"/>
+            </a:endParaRPr>
+          </a:p>
+          <a:p>
+            <a:pPr>
+              <a:lnSpc>
+                <a:spcPct val="150000"/>
+              </a:lnSpc>
+            </a:pPr>
+            <a:r>
+              <a:rPr lang="en-GB" b="0" i="0" dirty="0">
+                <a:solidFill>
+                  <a:srgbClr val="5F6368"/>
+                </a:solidFill>
+                <a:effectLst/>
+                <a:latin typeface="Roboto Mono" pitchFamily="49" charset="0"/>
+              </a:rPr>
+              <a:t>Scott </a:t>
+            </a:r>
+            <a:r>
+              <a:rPr lang="en-GB" b="0" i="0" dirty="0" err="1">
+                <a:solidFill>
+                  <a:srgbClr val="5F6368"/>
+                </a:solidFill>
+                <a:effectLst/>
+                <a:latin typeface="Roboto Mono" pitchFamily="49" charset="0"/>
+              </a:rPr>
+              <a:t>Bradlee</a:t>
+            </a:r>
+            <a:r>
+              <a:rPr lang="en-GB" b="0" i="0" dirty="0">
+                <a:solidFill>
+                  <a:srgbClr val="5F6368"/>
+                </a:solidFill>
+                <a:effectLst/>
+                <a:latin typeface="Roboto Mono" pitchFamily="49" charset="0"/>
+              </a:rPr>
+              <a:t> feat. Dave </a:t>
+            </a:r>
+            <a:r>
+              <a:rPr lang="en-GB" b="0" i="0" dirty="0" err="1">
+                <a:solidFill>
+                  <a:srgbClr val="5F6368"/>
+                </a:solidFill>
+                <a:effectLst/>
+                <a:latin typeface="Roboto Mono" pitchFamily="49" charset="0"/>
+              </a:rPr>
+              <a:t>Koz</a:t>
+            </a:r>
+            <a:endParaRPr lang="de-DE" dirty="0"/>
           </a:p>
         </p:txBody>
       </p:sp>

</xml_diff>